<commit_message>
Added a new App to show how to update view by using view model
</commit_message>
<xml_diff>
--- a/Presentations/UI5_003.pptx
+++ b/Presentations/UI5_003.pptx
@@ -9,7 +9,7 @@
     <p:sldId id="257" r:id="rId3"/>
     <p:sldId id="258" r:id="rId4"/>
     <p:sldId id="260" r:id="rId5"/>
-    <p:sldId id="259" r:id="rId6"/>
+    <p:sldId id="261" r:id="rId6"/>
   </p:sldIdLst>
   <p:sldSz cx="12192000" cy="6858000"/>
   <p:notesSz cx="6858000" cy="9144000"/>
@@ -12362,10 +12362,10 @@
       </p:grpSpPr>
       <p:sp>
         <p:nvSpPr>
-          <p:cNvPr id="2" name="Title 1">
+          <p:cNvPr id="4" name="Title 3">
             <a:extLst>
               <a:ext uri="{FF2B5EF4-FFF2-40B4-BE49-F238E27FC236}">
-                <a16:creationId xmlns:a16="http://schemas.microsoft.com/office/drawing/2014/main" id="{E76557E7-145A-4288-B333-B2E6571FAFA3}"/>
+                <a16:creationId xmlns:a16="http://schemas.microsoft.com/office/drawing/2014/main" id="{AB99A3A9-1BA5-4EAD-9B6F-495023820A50}"/>
               </a:ext>
             </a:extLst>
           </p:cNvPr>
@@ -12381,16 +12381,19 @@
           <a:bodyPr/>
           <a:lstStyle/>
           <a:p>
-            <a:endParaRPr lang="en-US"/>
+            <a:r>
+              <a:rPr lang="en-US" dirty="0"/>
+              <a:t>App#8: View Model</a:t>
+            </a:r>
           </a:p>
         </p:txBody>
       </p:sp>
       <p:sp>
         <p:nvSpPr>
-          <p:cNvPr id="3" name="Text Placeholder 2">
+          <p:cNvPr id="2" name="Text Placeholder 1">
             <a:extLst>
               <a:ext uri="{FF2B5EF4-FFF2-40B4-BE49-F238E27FC236}">
-                <a16:creationId xmlns:a16="http://schemas.microsoft.com/office/drawing/2014/main" id="{C0FBC753-E665-4253-945C-568F1AF5AB8E}"/>
+                <a16:creationId xmlns:a16="http://schemas.microsoft.com/office/drawing/2014/main" id="{AB981738-845F-49A4-941E-581364438677}"/>
               </a:ext>
             </a:extLst>
           </p:cNvPr>
@@ -12406,39 +12409,107 @@
           <a:bodyPr/>
           <a:lstStyle/>
           <a:p>
-            <a:endParaRPr lang="en-US"/>
+            <a:r>
+              <a:rPr lang="en-US" dirty="0" err="1"/>
+              <a:t>IconTabBar</a:t>
+            </a:r>
+            <a:endParaRPr lang="en-US" dirty="0"/>
+          </a:p>
+          <a:p>
+            <a:r>
+              <a:rPr lang="en-US" dirty="0" err="1"/>
+              <a:t>IconTabFilter</a:t>
+            </a:r>
+            <a:endParaRPr lang="en-US" dirty="0"/>
+          </a:p>
+          <a:p>
+            <a:r>
+              <a:rPr lang="en-US" dirty="0"/>
+              <a:t>Slider</a:t>
+            </a:r>
+          </a:p>
+          <a:p>
+            <a:r>
+              <a:rPr lang="en-US" dirty="0"/>
+              <a:t>Icon</a:t>
+            </a:r>
+          </a:p>
+          <a:p>
+            <a:r>
+              <a:rPr lang="en-US" dirty="0" err="1"/>
+              <a:t>OnLiveChange</a:t>
+            </a:r>
+            <a:r>
+              <a:rPr lang="en-US" dirty="0"/>
+              <a:t> event</a:t>
+            </a:r>
+          </a:p>
+          <a:p>
+            <a:r>
+              <a:rPr lang="en-US" dirty="0" err="1"/>
+              <a:t>JsonModel</a:t>
+            </a:r>
+            <a:endParaRPr lang="en-US" dirty="0"/>
+          </a:p>
+          <a:p>
+            <a:r>
+              <a:rPr lang="en-US" dirty="0" err="1"/>
+              <a:t>ViewModel</a:t>
+            </a:r>
+            <a:endParaRPr lang="en-US" dirty="0"/>
+          </a:p>
+          <a:p>
+            <a:r>
+              <a:rPr lang="en-US"/>
+              <a:t>Working with APIs</a:t>
+            </a:r>
+            <a:endParaRPr lang="en-US" dirty="0"/>
+          </a:p>
+          <a:p>
+            <a:endParaRPr lang="en-US" dirty="0"/>
           </a:p>
         </p:txBody>
       </p:sp>
-      <p:sp>
-        <p:nvSpPr>
-          <p:cNvPr id="4" name="Text Placeholder 3">
+      <p:pic>
+        <p:nvPicPr>
+          <p:cNvPr id="5" name="Picture 4" descr="A screenshot of a computer&#10;&#10;Description automatically generated">
             <a:extLst>
               <a:ext uri="{FF2B5EF4-FFF2-40B4-BE49-F238E27FC236}">
-                <a16:creationId xmlns:a16="http://schemas.microsoft.com/office/drawing/2014/main" id="{937B3D8A-B23E-4BDB-BF2C-E5DDFBFFBA83}"/>
+                <a16:creationId xmlns:a16="http://schemas.microsoft.com/office/drawing/2014/main" id="{361CD626-4F83-4274-8446-2A9AB2686893}"/>
               </a:ext>
             </a:extLst>
           </p:cNvPr>
-          <p:cNvSpPr>
-            <a:spLocks noGrp="1"/>
-          </p:cNvSpPr>
-          <p:nvPr>
-            <p:ph type="body" idx="2"/>
-          </p:nvPr>
-        </p:nvSpPr>
-        <p:spPr/>
-        <p:txBody>
-          <a:bodyPr/>
-          <a:lstStyle/>
-          <a:p>
-            <a:endParaRPr lang="en-US"/>
-          </a:p>
-        </p:txBody>
-      </p:sp>
+          <p:cNvPicPr>
+            <a:picLocks noChangeAspect="1"/>
+          </p:cNvPicPr>
+          <p:nvPr/>
+        </p:nvPicPr>
+        <p:blipFill>
+          <a:blip r:embed="rId2">
+            <a:extLst>
+              <a:ext uri="{28A0092B-C50C-407E-A947-70E740481C1C}">
+                <a14:useLocalDpi xmlns:a14="http://schemas.microsoft.com/office/drawing/2010/main" val="0"/>
+              </a:ext>
+            </a:extLst>
+          </a:blip>
+          <a:stretch>
+            <a:fillRect/>
+          </a:stretch>
+        </p:blipFill>
+        <p:spPr>
+          <a:xfrm>
+            <a:off x="5113251" y="0"/>
+            <a:ext cx="4839641" cy="6858000"/>
+          </a:xfrm>
+          <a:prstGeom prst="rect">
+            <a:avLst/>
+          </a:prstGeom>
+        </p:spPr>
+      </p:pic>
     </p:spTree>
     <p:extLst>
       <p:ext uri="{BB962C8B-B14F-4D97-AF65-F5344CB8AC3E}">
-        <p14:creationId xmlns:p14="http://schemas.microsoft.com/office/powerpoint/2010/main" val="89444566"/>
+        <p14:creationId xmlns:p14="http://schemas.microsoft.com/office/powerpoint/2010/main" val="1570314837"/>
       </p:ext>
     </p:extLst>
   </p:cSld>

</xml_diff>

<commit_message>
App9 added. app8 some fixes.
</commit_message>
<xml_diff>
--- a/Presentations/UI5_003.pptx
+++ b/Presentations/UI5_003.pptx
@@ -9,7 +9,10 @@
     <p:sldId id="257" r:id="rId3"/>
     <p:sldId id="258" r:id="rId4"/>
     <p:sldId id="260" r:id="rId5"/>
-    <p:sldId id="261" r:id="rId6"/>
+    <p:sldId id="262" r:id="rId6"/>
+    <p:sldId id="263" r:id="rId7"/>
+    <p:sldId id="261" r:id="rId8"/>
+    <p:sldId id="264" r:id="rId9"/>
   </p:sldIdLst>
   <p:sldSz cx="12192000" cy="6858000"/>
   <p:notesSz cx="6858000" cy="9144000"/>
@@ -12362,6 +12365,3037 @@
       </p:grpSpPr>
       <p:sp>
         <p:nvSpPr>
+          <p:cNvPr id="2" name="Title 1">
+            <a:extLst>
+              <a:ext uri="{FF2B5EF4-FFF2-40B4-BE49-F238E27FC236}">
+                <a16:creationId xmlns:a16="http://schemas.microsoft.com/office/drawing/2014/main" id="{59E9C46E-0E6C-487F-8782-A5F368C90A27}"/>
+              </a:ext>
+            </a:extLst>
+          </p:cNvPr>
+          <p:cNvSpPr>
+            <a:spLocks noGrp="1"/>
+          </p:cNvSpPr>
+          <p:nvPr>
+            <p:ph type="title"/>
+          </p:nvPr>
+        </p:nvSpPr>
+        <p:spPr>
+          <a:xfrm>
+            <a:off x="152400" y="365125"/>
+            <a:ext cx="5597450" cy="1325563"/>
+          </a:xfrm>
+        </p:spPr>
+        <p:txBody>
+          <a:bodyPr/>
+          <a:lstStyle/>
+          <a:p>
+            <a:r>
+              <a:rPr lang="en-US" dirty="0"/>
+              <a:t>Models in UI5</a:t>
+            </a:r>
+          </a:p>
+        </p:txBody>
+      </p:sp>
+      <p:sp>
+        <p:nvSpPr>
+          <p:cNvPr id="3" name="Text Placeholder 2">
+            <a:extLst>
+              <a:ext uri="{FF2B5EF4-FFF2-40B4-BE49-F238E27FC236}">
+                <a16:creationId xmlns:a16="http://schemas.microsoft.com/office/drawing/2014/main" id="{F7C65F23-05A9-43B5-AD12-599DF3D424DA}"/>
+              </a:ext>
+            </a:extLst>
+          </p:cNvPr>
+          <p:cNvSpPr>
+            <a:spLocks noGrp="1"/>
+          </p:cNvSpPr>
+          <p:nvPr>
+            <p:ph type="body" idx="1"/>
+          </p:nvPr>
+        </p:nvSpPr>
+        <p:spPr>
+          <a:xfrm>
+            <a:off x="152395" y="1825625"/>
+            <a:ext cx="4844561" cy="4837206"/>
+          </a:xfrm>
+        </p:spPr>
+        <p:txBody>
+          <a:bodyPr>
+            <a:normAutofit/>
+          </a:bodyPr>
+          <a:lstStyle/>
+          <a:p>
+            <a:r>
+              <a:rPr lang="en-GB" dirty="0"/>
+              <a:t>A model in the MVC concept holds the data and provides methods to retrieve the data from the database and to set, delete or update data.</a:t>
+            </a:r>
+          </a:p>
+          <a:p>
+            <a:r>
+              <a:rPr lang="en-US" dirty="0"/>
+              <a:t>Models can update bound elements of the views directly.</a:t>
+            </a:r>
+          </a:p>
+        </p:txBody>
+      </p:sp>
+      <p:grpSp>
+        <p:nvGrpSpPr>
+          <p:cNvPr id="7" name="Group 6">
+            <a:extLst>
+              <a:ext uri="{FF2B5EF4-FFF2-40B4-BE49-F238E27FC236}">
+                <a16:creationId xmlns:a16="http://schemas.microsoft.com/office/drawing/2014/main" id="{BE9D3015-6BCF-40B8-8DA8-B47626B74EE6}"/>
+              </a:ext>
+            </a:extLst>
+          </p:cNvPr>
+          <p:cNvGrpSpPr/>
+          <p:nvPr/>
+        </p:nvGrpSpPr>
+        <p:grpSpPr>
+          <a:xfrm>
+            <a:off x="5835535" y="4133461"/>
+            <a:ext cx="4031672" cy="2608161"/>
+            <a:chOff x="5835535" y="4133461"/>
+            <a:chExt cx="4031672" cy="2608161"/>
+          </a:xfrm>
+        </p:grpSpPr>
+        <p:sp>
+          <p:nvSpPr>
+            <p:cNvPr id="5" name="Rectangle 4">
+              <a:extLst>
+                <a:ext uri="{FF2B5EF4-FFF2-40B4-BE49-F238E27FC236}">
+                  <a16:creationId xmlns:a16="http://schemas.microsoft.com/office/drawing/2014/main" id="{D9D3D4AE-B772-4C52-81F6-07BE51A8811B}"/>
+                </a:ext>
+              </a:extLst>
+            </p:cNvPr>
+            <p:cNvSpPr/>
+            <p:nvPr/>
+          </p:nvSpPr>
+          <p:spPr>
+            <a:xfrm>
+              <a:off x="5835535" y="4133461"/>
+              <a:ext cx="4031672" cy="2608161"/>
+            </a:xfrm>
+            <a:prstGeom prst="rect">
+              <a:avLst/>
+            </a:prstGeom>
+            <a:noFill/>
+            <a:ln>
+              <a:prstDash val="dash"/>
+            </a:ln>
+          </p:spPr>
+          <p:style>
+            <a:lnRef idx="2">
+              <a:schemeClr val="accent1">
+                <a:shade val="50000"/>
+              </a:schemeClr>
+            </a:lnRef>
+            <a:fillRef idx="1">
+              <a:schemeClr val="accent1"/>
+            </a:fillRef>
+            <a:effectRef idx="0">
+              <a:schemeClr val="accent1"/>
+            </a:effectRef>
+            <a:fontRef idx="minor">
+              <a:schemeClr val="lt1"/>
+            </a:fontRef>
+          </p:style>
+          <p:txBody>
+            <a:bodyPr rtlCol="0" anchor="ctr"/>
+            <a:lstStyle/>
+            <a:p>
+              <a:pPr algn="ctr"/>
+              <a:endParaRPr lang="en-US" dirty="0"/>
+            </a:p>
+          </p:txBody>
+        </p:sp>
+        <p:sp>
+          <p:nvSpPr>
+            <p:cNvPr id="6" name="TextBox 5">
+              <a:extLst>
+                <a:ext uri="{FF2B5EF4-FFF2-40B4-BE49-F238E27FC236}">
+                  <a16:creationId xmlns:a16="http://schemas.microsoft.com/office/drawing/2014/main" id="{09B7CB09-E4FB-4257-B3A3-1BFDB2826881}"/>
+                </a:ext>
+              </a:extLst>
+            </p:cNvPr>
+            <p:cNvSpPr txBox="1"/>
+            <p:nvPr/>
+          </p:nvSpPr>
+          <p:spPr>
+            <a:xfrm>
+              <a:off x="5835535" y="4133461"/>
+              <a:ext cx="1119673" cy="369332"/>
+            </a:xfrm>
+            <a:prstGeom prst="rect">
+              <a:avLst/>
+            </a:prstGeom>
+            <a:noFill/>
+          </p:spPr>
+          <p:txBody>
+            <a:bodyPr wrap="square" rtlCol="0">
+              <a:spAutoFit/>
+            </a:bodyPr>
+            <a:lstStyle/>
+            <a:p>
+              <a:r>
+                <a:rPr lang="en-US" dirty="0"/>
+                <a:t>Server</a:t>
+              </a:r>
+            </a:p>
+          </p:txBody>
+        </p:sp>
+      </p:grpSp>
+      <p:sp>
+        <p:nvSpPr>
+          <p:cNvPr id="8" name="Flowchart: Magnetic Disk 7">
+            <a:extLst>
+              <a:ext uri="{FF2B5EF4-FFF2-40B4-BE49-F238E27FC236}">
+                <a16:creationId xmlns:a16="http://schemas.microsoft.com/office/drawing/2014/main" id="{F2D21B90-EFB5-4D8B-9DBE-7779A6466BDD}"/>
+              </a:ext>
+            </a:extLst>
+          </p:cNvPr>
+          <p:cNvSpPr/>
+          <p:nvPr/>
+        </p:nvSpPr>
+        <p:spPr>
+          <a:xfrm>
+            <a:off x="8350897" y="5963035"/>
+            <a:ext cx="1091683" cy="699796"/>
+          </a:xfrm>
+          <a:prstGeom prst="flowChartMagneticDisk">
+            <a:avLst/>
+          </a:prstGeom>
+        </p:spPr>
+        <p:style>
+          <a:lnRef idx="2">
+            <a:schemeClr val="accent1">
+              <a:shade val="50000"/>
+            </a:schemeClr>
+          </a:lnRef>
+          <a:fillRef idx="1">
+            <a:schemeClr val="accent1"/>
+          </a:fillRef>
+          <a:effectRef idx="0">
+            <a:schemeClr val="accent1"/>
+          </a:effectRef>
+          <a:fontRef idx="minor">
+            <a:schemeClr val="lt1"/>
+          </a:fontRef>
+        </p:style>
+        <p:txBody>
+          <a:bodyPr rtlCol="0" anchor="ctr"/>
+          <a:lstStyle/>
+          <a:p>
+            <a:pPr algn="ctr"/>
+            <a:r>
+              <a:rPr lang="en-US" dirty="0"/>
+              <a:t>DB</a:t>
+            </a:r>
+          </a:p>
+        </p:txBody>
+      </p:sp>
+      <p:sp>
+        <p:nvSpPr>
+          <p:cNvPr id="10" name="TextBox 9">
+            <a:extLst>
+              <a:ext uri="{FF2B5EF4-FFF2-40B4-BE49-F238E27FC236}">
+                <a16:creationId xmlns:a16="http://schemas.microsoft.com/office/drawing/2014/main" id="{4F13E2DE-7D12-4C9C-95C9-B04676D8ABF2}"/>
+              </a:ext>
+            </a:extLst>
+          </p:cNvPr>
+          <p:cNvSpPr txBox="1"/>
+          <p:nvPr/>
+        </p:nvSpPr>
+        <p:spPr>
+          <a:xfrm>
+            <a:off x="7931020" y="5068209"/>
+            <a:ext cx="1861457" cy="369332"/>
+          </a:xfrm>
+          <a:prstGeom prst="rect">
+            <a:avLst/>
+          </a:prstGeom>
+        </p:spPr>
+        <p:style>
+          <a:lnRef idx="2">
+            <a:schemeClr val="accent6">
+              <a:shade val="50000"/>
+            </a:schemeClr>
+          </a:lnRef>
+          <a:fillRef idx="1">
+            <a:schemeClr val="accent6"/>
+          </a:fillRef>
+          <a:effectRef idx="0">
+            <a:schemeClr val="accent6"/>
+          </a:effectRef>
+          <a:fontRef idx="minor">
+            <a:schemeClr val="lt1"/>
+          </a:fontRef>
+        </p:style>
+        <p:txBody>
+          <a:bodyPr wrap="square" rtlCol="0">
+            <a:spAutoFit/>
+          </a:bodyPr>
+          <a:lstStyle/>
+          <a:p>
+            <a:r>
+              <a:rPr lang="en-US" dirty="0"/>
+              <a:t>OData Gateway </a:t>
+            </a:r>
+          </a:p>
+        </p:txBody>
+      </p:sp>
+      <p:cxnSp>
+        <p:nvCxnSpPr>
+          <p:cNvPr id="12" name="Straight Arrow Connector 11">
+            <a:extLst>
+              <a:ext uri="{FF2B5EF4-FFF2-40B4-BE49-F238E27FC236}">
+                <a16:creationId xmlns:a16="http://schemas.microsoft.com/office/drawing/2014/main" id="{CEC76283-2692-45E7-A96E-2A6319F66C2A}"/>
+              </a:ext>
+            </a:extLst>
+          </p:cNvPr>
+          <p:cNvCxnSpPr/>
+          <p:nvPr/>
+        </p:nvCxnSpPr>
+        <p:spPr>
+          <a:xfrm>
+            <a:off x="8556171" y="5437541"/>
+            <a:ext cx="0" cy="674010"/>
+          </a:xfrm>
+          <a:prstGeom prst="straightConnector1">
+            <a:avLst/>
+          </a:prstGeom>
+          <a:ln w="38100">
+            <a:tailEnd type="triangle"/>
+          </a:ln>
+        </p:spPr>
+        <p:style>
+          <a:lnRef idx="1">
+            <a:schemeClr val="accent2"/>
+          </a:lnRef>
+          <a:fillRef idx="0">
+            <a:schemeClr val="accent2"/>
+          </a:fillRef>
+          <a:effectRef idx="0">
+            <a:schemeClr val="accent2"/>
+          </a:effectRef>
+          <a:fontRef idx="minor">
+            <a:schemeClr val="tx1"/>
+          </a:fontRef>
+        </p:style>
+      </p:cxnSp>
+      <p:cxnSp>
+        <p:nvCxnSpPr>
+          <p:cNvPr id="13" name="Straight Arrow Connector 12">
+            <a:extLst>
+              <a:ext uri="{FF2B5EF4-FFF2-40B4-BE49-F238E27FC236}">
+                <a16:creationId xmlns:a16="http://schemas.microsoft.com/office/drawing/2014/main" id="{B6850415-C86D-4250-903A-84F530B11671}"/>
+              </a:ext>
+            </a:extLst>
+          </p:cNvPr>
+          <p:cNvCxnSpPr/>
+          <p:nvPr/>
+        </p:nvCxnSpPr>
+        <p:spPr>
+          <a:xfrm>
+            <a:off x="9184433" y="5437541"/>
+            <a:ext cx="0" cy="674010"/>
+          </a:xfrm>
+          <a:prstGeom prst="straightConnector1">
+            <a:avLst/>
+          </a:prstGeom>
+          <a:ln w="38100">
+            <a:headEnd type="triangle"/>
+            <a:tailEnd type="none"/>
+          </a:ln>
+        </p:spPr>
+        <p:style>
+          <a:lnRef idx="1">
+            <a:schemeClr val="accent2"/>
+          </a:lnRef>
+          <a:fillRef idx="0">
+            <a:schemeClr val="accent2"/>
+          </a:fillRef>
+          <a:effectRef idx="0">
+            <a:schemeClr val="accent2"/>
+          </a:effectRef>
+          <a:fontRef idx="minor">
+            <a:schemeClr val="tx1"/>
+          </a:fontRef>
+        </p:style>
+      </p:cxnSp>
+      <p:grpSp>
+        <p:nvGrpSpPr>
+          <p:cNvPr id="16" name="Group 15">
+            <a:extLst>
+              <a:ext uri="{FF2B5EF4-FFF2-40B4-BE49-F238E27FC236}">
+                <a16:creationId xmlns:a16="http://schemas.microsoft.com/office/drawing/2014/main" id="{7BE6D9FC-3E56-442E-B778-419C2917791E}"/>
+              </a:ext>
+            </a:extLst>
+          </p:cNvPr>
+          <p:cNvGrpSpPr/>
+          <p:nvPr/>
+        </p:nvGrpSpPr>
+        <p:grpSpPr>
+          <a:xfrm>
+            <a:off x="5835534" y="221219"/>
+            <a:ext cx="4031673" cy="2608161"/>
+            <a:chOff x="5835534" y="221219"/>
+            <a:chExt cx="4031673" cy="2608161"/>
+          </a:xfrm>
+        </p:grpSpPr>
+        <p:sp>
+          <p:nvSpPr>
+            <p:cNvPr id="14" name="Rectangle 13">
+              <a:extLst>
+                <a:ext uri="{FF2B5EF4-FFF2-40B4-BE49-F238E27FC236}">
+                  <a16:creationId xmlns:a16="http://schemas.microsoft.com/office/drawing/2014/main" id="{1AEC82A0-32E6-4A7D-A1FC-E03A03A1EB56}"/>
+                </a:ext>
+              </a:extLst>
+            </p:cNvPr>
+            <p:cNvSpPr/>
+            <p:nvPr/>
+          </p:nvSpPr>
+          <p:spPr>
+            <a:xfrm>
+              <a:off x="5835535" y="221219"/>
+              <a:ext cx="4031672" cy="2608161"/>
+            </a:xfrm>
+            <a:prstGeom prst="rect">
+              <a:avLst/>
+            </a:prstGeom>
+            <a:noFill/>
+            <a:ln>
+              <a:solidFill>
+                <a:srgbClr val="FF0000"/>
+              </a:solidFill>
+              <a:prstDash val="dash"/>
+            </a:ln>
+          </p:spPr>
+          <p:style>
+            <a:lnRef idx="2">
+              <a:schemeClr val="accent1">
+                <a:shade val="50000"/>
+              </a:schemeClr>
+            </a:lnRef>
+            <a:fillRef idx="1">
+              <a:schemeClr val="accent1"/>
+            </a:fillRef>
+            <a:effectRef idx="0">
+              <a:schemeClr val="accent1"/>
+            </a:effectRef>
+            <a:fontRef idx="minor">
+              <a:schemeClr val="lt1"/>
+            </a:fontRef>
+          </p:style>
+          <p:txBody>
+            <a:bodyPr rtlCol="0" anchor="ctr"/>
+            <a:lstStyle/>
+            <a:p>
+              <a:pPr algn="ctr"/>
+              <a:endParaRPr lang="en-US" dirty="0"/>
+            </a:p>
+          </p:txBody>
+        </p:sp>
+        <p:sp>
+          <p:nvSpPr>
+            <p:cNvPr id="15" name="TextBox 14">
+              <a:extLst>
+                <a:ext uri="{FF2B5EF4-FFF2-40B4-BE49-F238E27FC236}">
+                  <a16:creationId xmlns:a16="http://schemas.microsoft.com/office/drawing/2014/main" id="{B50A3463-627E-43FA-B488-77EC8834A64B}"/>
+                </a:ext>
+              </a:extLst>
+            </p:cNvPr>
+            <p:cNvSpPr txBox="1"/>
+            <p:nvPr/>
+          </p:nvSpPr>
+          <p:spPr>
+            <a:xfrm>
+              <a:off x="5835534" y="221219"/>
+              <a:ext cx="1712931" cy="369332"/>
+            </a:xfrm>
+            <a:prstGeom prst="rect">
+              <a:avLst/>
+            </a:prstGeom>
+            <a:noFill/>
+          </p:spPr>
+          <p:txBody>
+            <a:bodyPr wrap="square" rtlCol="0">
+              <a:spAutoFit/>
+            </a:bodyPr>
+            <a:lstStyle/>
+            <a:p>
+              <a:r>
+                <a:rPr lang="en-US" dirty="0"/>
+                <a:t>Client-Browser</a:t>
+              </a:r>
+            </a:p>
+          </p:txBody>
+        </p:sp>
+      </p:grpSp>
+      <p:sp>
+        <p:nvSpPr>
+          <p:cNvPr id="18" name="Flowchart: Multidocument 17">
+            <a:extLst>
+              <a:ext uri="{FF2B5EF4-FFF2-40B4-BE49-F238E27FC236}">
+                <a16:creationId xmlns:a16="http://schemas.microsoft.com/office/drawing/2014/main" id="{1B039723-D4D0-4052-915B-41A74CBDAEAE}"/>
+              </a:ext>
+            </a:extLst>
+          </p:cNvPr>
+          <p:cNvSpPr/>
+          <p:nvPr/>
+        </p:nvSpPr>
+        <p:spPr>
+          <a:xfrm>
+            <a:off x="6176864" y="5068209"/>
+            <a:ext cx="1565989" cy="1594622"/>
+          </a:xfrm>
+          <a:prstGeom prst="flowChartMultidocument">
+            <a:avLst/>
+          </a:prstGeom>
+        </p:spPr>
+        <p:style>
+          <a:lnRef idx="2">
+            <a:schemeClr val="accent4">
+              <a:shade val="50000"/>
+            </a:schemeClr>
+          </a:lnRef>
+          <a:fillRef idx="1">
+            <a:schemeClr val="accent4"/>
+          </a:fillRef>
+          <a:effectRef idx="0">
+            <a:schemeClr val="accent4"/>
+          </a:effectRef>
+          <a:fontRef idx="minor">
+            <a:schemeClr val="lt1"/>
+          </a:fontRef>
+        </p:style>
+        <p:txBody>
+          <a:bodyPr rtlCol="0" anchor="ctr"/>
+          <a:lstStyle/>
+          <a:p>
+            <a:pPr algn="ctr"/>
+            <a:r>
+              <a:rPr lang="en-US" sz="1600" dirty="0"/>
+              <a:t>HTML, CSS, JS, JSON, i18n,  XML</a:t>
+            </a:r>
+          </a:p>
+        </p:txBody>
+      </p:sp>
+      <p:sp>
+        <p:nvSpPr>
+          <p:cNvPr id="19" name="Rectangle 18">
+            <a:extLst>
+              <a:ext uri="{FF2B5EF4-FFF2-40B4-BE49-F238E27FC236}">
+                <a16:creationId xmlns:a16="http://schemas.microsoft.com/office/drawing/2014/main" id="{76A7A2FA-FC3B-4C32-B6CF-67A1CE9AA9F3}"/>
+              </a:ext>
+            </a:extLst>
+          </p:cNvPr>
+          <p:cNvSpPr/>
+          <p:nvPr/>
+        </p:nvSpPr>
+        <p:spPr>
+          <a:xfrm>
+            <a:off x="5953882" y="670573"/>
+            <a:ext cx="1184987" cy="484163"/>
+          </a:xfrm>
+          <a:prstGeom prst="rect">
+            <a:avLst/>
+          </a:prstGeom>
+        </p:spPr>
+        <p:style>
+          <a:lnRef idx="2">
+            <a:schemeClr val="accent4"/>
+          </a:lnRef>
+          <a:fillRef idx="1">
+            <a:schemeClr val="lt1"/>
+          </a:fillRef>
+          <a:effectRef idx="0">
+            <a:schemeClr val="accent4"/>
+          </a:effectRef>
+          <a:fontRef idx="minor">
+            <a:schemeClr val="dk1"/>
+          </a:fontRef>
+        </p:style>
+        <p:txBody>
+          <a:bodyPr rtlCol="0" anchor="ctr"/>
+          <a:lstStyle/>
+          <a:p>
+            <a:pPr algn="ctr"/>
+            <a:r>
+              <a:rPr lang="en-US" dirty="0"/>
+              <a:t>JSON</a:t>
+            </a:r>
+          </a:p>
+        </p:txBody>
+      </p:sp>
+      <p:sp>
+        <p:nvSpPr>
+          <p:cNvPr id="20" name="Rectangle 19">
+            <a:extLst>
+              <a:ext uri="{FF2B5EF4-FFF2-40B4-BE49-F238E27FC236}">
+                <a16:creationId xmlns:a16="http://schemas.microsoft.com/office/drawing/2014/main" id="{F9532D67-78A5-4926-AA6E-A6AAA4B6C40F}"/>
+              </a:ext>
+            </a:extLst>
+          </p:cNvPr>
+          <p:cNvSpPr/>
+          <p:nvPr/>
+        </p:nvSpPr>
+        <p:spPr>
+          <a:xfrm>
+            <a:off x="5953882" y="1322613"/>
+            <a:ext cx="1184987" cy="484163"/>
+          </a:xfrm>
+          <a:prstGeom prst="rect">
+            <a:avLst/>
+          </a:prstGeom>
+        </p:spPr>
+        <p:style>
+          <a:lnRef idx="2">
+            <a:schemeClr val="accent5"/>
+          </a:lnRef>
+          <a:fillRef idx="1">
+            <a:schemeClr val="lt1"/>
+          </a:fillRef>
+          <a:effectRef idx="0">
+            <a:schemeClr val="accent5"/>
+          </a:effectRef>
+          <a:fontRef idx="minor">
+            <a:schemeClr val="dk1"/>
+          </a:fontRef>
+        </p:style>
+        <p:txBody>
+          <a:bodyPr rtlCol="0" anchor="ctr"/>
+          <a:lstStyle/>
+          <a:p>
+            <a:pPr algn="ctr"/>
+            <a:r>
+              <a:rPr lang="en-US" dirty="0"/>
+              <a:t>XML</a:t>
+            </a:r>
+          </a:p>
+        </p:txBody>
+      </p:sp>
+      <p:sp>
+        <p:nvSpPr>
+          <p:cNvPr id="21" name="Rectangle 20">
+            <a:extLst>
+              <a:ext uri="{FF2B5EF4-FFF2-40B4-BE49-F238E27FC236}">
+                <a16:creationId xmlns:a16="http://schemas.microsoft.com/office/drawing/2014/main" id="{56C2367C-4DA5-4BE9-972D-FA97C5691626}"/>
+              </a:ext>
+            </a:extLst>
+          </p:cNvPr>
+          <p:cNvSpPr/>
+          <p:nvPr/>
+        </p:nvSpPr>
+        <p:spPr>
+          <a:xfrm>
+            <a:off x="5953118" y="1974654"/>
+            <a:ext cx="1184988" cy="484163"/>
+          </a:xfrm>
+          <a:prstGeom prst="rect">
+            <a:avLst/>
+          </a:prstGeom>
+        </p:spPr>
+        <p:style>
+          <a:lnRef idx="2">
+            <a:schemeClr val="accent2"/>
+          </a:lnRef>
+          <a:fillRef idx="1">
+            <a:schemeClr val="lt1"/>
+          </a:fillRef>
+          <a:effectRef idx="0">
+            <a:schemeClr val="accent2"/>
+          </a:effectRef>
+          <a:fontRef idx="minor">
+            <a:schemeClr val="dk1"/>
+          </a:fontRef>
+        </p:style>
+        <p:txBody>
+          <a:bodyPr rtlCol="0" anchor="ctr"/>
+          <a:lstStyle/>
+          <a:p>
+            <a:pPr algn="ctr"/>
+            <a:r>
+              <a:rPr lang="en-US" dirty="0"/>
+              <a:t>Resource</a:t>
+            </a:r>
+          </a:p>
+        </p:txBody>
+      </p:sp>
+      <p:sp>
+        <p:nvSpPr>
+          <p:cNvPr id="22" name="Rectangle 21">
+            <a:extLst>
+              <a:ext uri="{FF2B5EF4-FFF2-40B4-BE49-F238E27FC236}">
+                <a16:creationId xmlns:a16="http://schemas.microsoft.com/office/drawing/2014/main" id="{80447DF6-8C61-4230-84CB-219234AFA8F0}"/>
+              </a:ext>
+            </a:extLst>
+          </p:cNvPr>
+          <p:cNvSpPr/>
+          <p:nvPr/>
+        </p:nvSpPr>
+        <p:spPr>
+          <a:xfrm>
+            <a:off x="8591939" y="1974654"/>
+            <a:ext cx="1184987" cy="484163"/>
+          </a:xfrm>
+          <a:prstGeom prst="rect">
+            <a:avLst/>
+          </a:prstGeom>
+        </p:spPr>
+        <p:style>
+          <a:lnRef idx="2">
+            <a:schemeClr val="accent6"/>
+          </a:lnRef>
+          <a:fillRef idx="1">
+            <a:schemeClr val="lt1"/>
+          </a:fillRef>
+          <a:effectRef idx="0">
+            <a:schemeClr val="accent6"/>
+          </a:effectRef>
+          <a:fontRef idx="minor">
+            <a:schemeClr val="dk1"/>
+          </a:fontRef>
+        </p:style>
+        <p:txBody>
+          <a:bodyPr rtlCol="0" anchor="ctr"/>
+          <a:lstStyle/>
+          <a:p>
+            <a:pPr algn="ctr"/>
+            <a:r>
+              <a:rPr lang="en-US" dirty="0"/>
+              <a:t>OData</a:t>
+            </a:r>
+          </a:p>
+        </p:txBody>
+      </p:sp>
+      <p:sp>
+        <p:nvSpPr>
+          <p:cNvPr id="23" name="Arrow: Up-Down 22">
+            <a:extLst>
+              <a:ext uri="{FF2B5EF4-FFF2-40B4-BE49-F238E27FC236}">
+                <a16:creationId xmlns:a16="http://schemas.microsoft.com/office/drawing/2014/main" id="{E5BE3BF2-D7D3-48DF-9965-59176FF2217E}"/>
+              </a:ext>
+            </a:extLst>
+          </p:cNvPr>
+          <p:cNvSpPr/>
+          <p:nvPr/>
+        </p:nvSpPr>
+        <p:spPr>
+          <a:xfrm>
+            <a:off x="7663183" y="2688319"/>
+            <a:ext cx="535673" cy="1586204"/>
+          </a:xfrm>
+          <a:prstGeom prst="upDownArrow">
+            <a:avLst/>
+          </a:prstGeom>
+        </p:spPr>
+        <p:style>
+          <a:lnRef idx="2">
+            <a:schemeClr val="accent3">
+              <a:shade val="50000"/>
+            </a:schemeClr>
+          </a:lnRef>
+          <a:fillRef idx="1">
+            <a:schemeClr val="accent3"/>
+          </a:fillRef>
+          <a:effectRef idx="0">
+            <a:schemeClr val="accent3"/>
+          </a:effectRef>
+          <a:fontRef idx="minor">
+            <a:schemeClr val="lt1"/>
+          </a:fontRef>
+        </p:style>
+        <p:txBody>
+          <a:bodyPr rtlCol="0" anchor="ctr"/>
+          <a:lstStyle/>
+          <a:p>
+            <a:pPr algn="ctr"/>
+            <a:r>
+              <a:rPr lang="en-US" dirty="0"/>
+              <a:t>HTTPS</a:t>
+            </a:r>
+          </a:p>
+        </p:txBody>
+      </p:sp>
+      <p:cxnSp>
+        <p:nvCxnSpPr>
+          <p:cNvPr id="25" name="Connector: Curved 24">
+            <a:extLst>
+              <a:ext uri="{FF2B5EF4-FFF2-40B4-BE49-F238E27FC236}">
+                <a16:creationId xmlns:a16="http://schemas.microsoft.com/office/drawing/2014/main" id="{6CF14C7D-CC99-4D5A-AB18-012FAC72FF6B}"/>
+              </a:ext>
+            </a:extLst>
+          </p:cNvPr>
+          <p:cNvCxnSpPr>
+            <a:stCxn id="18" idx="0"/>
+            <a:endCxn id="23" idx="4"/>
+          </p:cNvCxnSpPr>
+          <p:nvPr/>
+        </p:nvCxnSpPr>
+        <p:spPr>
+          <a:xfrm rot="5400000" flipH="1" flipV="1">
+            <a:off x="7102463" y="4239653"/>
+            <a:ext cx="793686" cy="863427"/>
+          </a:xfrm>
+          <a:prstGeom prst="curvedConnector3">
+            <a:avLst/>
+          </a:prstGeom>
+          <a:ln>
+            <a:tailEnd type="triangle"/>
+          </a:ln>
+        </p:spPr>
+        <p:style>
+          <a:lnRef idx="1">
+            <a:schemeClr val="accent1"/>
+          </a:lnRef>
+          <a:fillRef idx="0">
+            <a:schemeClr val="accent1"/>
+          </a:fillRef>
+          <a:effectRef idx="0">
+            <a:schemeClr val="accent1"/>
+          </a:effectRef>
+          <a:fontRef idx="minor">
+            <a:schemeClr val="tx1"/>
+          </a:fontRef>
+        </p:style>
+      </p:cxnSp>
+      <p:cxnSp>
+        <p:nvCxnSpPr>
+          <p:cNvPr id="27" name="Connector: Curved 26">
+            <a:extLst>
+              <a:ext uri="{FF2B5EF4-FFF2-40B4-BE49-F238E27FC236}">
+                <a16:creationId xmlns:a16="http://schemas.microsoft.com/office/drawing/2014/main" id="{80C2D8C4-29A5-4CCF-A8BC-C40188A411F1}"/>
+              </a:ext>
+            </a:extLst>
+          </p:cNvPr>
+          <p:cNvCxnSpPr>
+            <a:stCxn id="10" idx="0"/>
+            <a:endCxn id="23" idx="4"/>
+          </p:cNvCxnSpPr>
+          <p:nvPr/>
+        </p:nvCxnSpPr>
+        <p:spPr>
+          <a:xfrm rot="16200000" flipV="1">
+            <a:off x="7999542" y="4206001"/>
+            <a:ext cx="793686" cy="930729"/>
+          </a:xfrm>
+          <a:prstGeom prst="curvedConnector3">
+            <a:avLst/>
+          </a:prstGeom>
+          <a:ln>
+            <a:tailEnd type="triangle"/>
+          </a:ln>
+        </p:spPr>
+        <p:style>
+          <a:lnRef idx="1">
+            <a:schemeClr val="accent2"/>
+          </a:lnRef>
+          <a:fillRef idx="0">
+            <a:schemeClr val="accent2"/>
+          </a:fillRef>
+          <a:effectRef idx="0">
+            <a:schemeClr val="accent2"/>
+          </a:effectRef>
+          <a:fontRef idx="minor">
+            <a:schemeClr val="tx1"/>
+          </a:fontRef>
+        </p:style>
+      </p:cxnSp>
+      <p:cxnSp>
+        <p:nvCxnSpPr>
+          <p:cNvPr id="29" name="Connector: Curved 28">
+            <a:extLst>
+              <a:ext uri="{FF2B5EF4-FFF2-40B4-BE49-F238E27FC236}">
+                <a16:creationId xmlns:a16="http://schemas.microsoft.com/office/drawing/2014/main" id="{F48BAFCC-2C27-46D1-AD40-D20AFF5CE15D}"/>
+              </a:ext>
+            </a:extLst>
+          </p:cNvPr>
+          <p:cNvCxnSpPr>
+            <a:stCxn id="23" idx="0"/>
+            <a:endCxn id="21" idx="3"/>
+          </p:cNvCxnSpPr>
+          <p:nvPr/>
+        </p:nvCxnSpPr>
+        <p:spPr>
+          <a:xfrm rot="16200000" flipV="1">
+            <a:off x="7298772" y="2056071"/>
+            <a:ext cx="471583" cy="792914"/>
+          </a:xfrm>
+          <a:prstGeom prst="curvedConnector2">
+            <a:avLst/>
+          </a:prstGeom>
+          <a:ln>
+            <a:tailEnd type="triangle"/>
+          </a:ln>
+        </p:spPr>
+        <p:style>
+          <a:lnRef idx="1">
+            <a:schemeClr val="accent1"/>
+          </a:lnRef>
+          <a:fillRef idx="0">
+            <a:schemeClr val="accent1"/>
+          </a:fillRef>
+          <a:effectRef idx="0">
+            <a:schemeClr val="accent1"/>
+          </a:effectRef>
+          <a:fontRef idx="minor">
+            <a:schemeClr val="tx1"/>
+          </a:fontRef>
+        </p:style>
+      </p:cxnSp>
+      <p:cxnSp>
+        <p:nvCxnSpPr>
+          <p:cNvPr id="31" name="Connector: Curved 30">
+            <a:extLst>
+              <a:ext uri="{FF2B5EF4-FFF2-40B4-BE49-F238E27FC236}">
+                <a16:creationId xmlns:a16="http://schemas.microsoft.com/office/drawing/2014/main" id="{516218A2-843E-4CD2-B75B-02D008D1B3DF}"/>
+              </a:ext>
+            </a:extLst>
+          </p:cNvPr>
+          <p:cNvCxnSpPr>
+            <a:stCxn id="23" idx="0"/>
+            <a:endCxn id="20" idx="3"/>
+          </p:cNvCxnSpPr>
+          <p:nvPr/>
+        </p:nvCxnSpPr>
+        <p:spPr>
+          <a:xfrm rot="16200000" flipV="1">
+            <a:off x="6973133" y="1730431"/>
+            <a:ext cx="1123624" cy="792151"/>
+          </a:xfrm>
+          <a:prstGeom prst="curvedConnector2">
+            <a:avLst/>
+          </a:prstGeom>
+          <a:ln>
+            <a:tailEnd type="triangle"/>
+          </a:ln>
+        </p:spPr>
+        <p:style>
+          <a:lnRef idx="1">
+            <a:schemeClr val="accent1"/>
+          </a:lnRef>
+          <a:fillRef idx="0">
+            <a:schemeClr val="accent1"/>
+          </a:fillRef>
+          <a:effectRef idx="0">
+            <a:schemeClr val="accent1"/>
+          </a:effectRef>
+          <a:fontRef idx="minor">
+            <a:schemeClr val="tx1"/>
+          </a:fontRef>
+        </p:style>
+      </p:cxnSp>
+      <p:cxnSp>
+        <p:nvCxnSpPr>
+          <p:cNvPr id="33" name="Connector: Curved 32">
+            <a:extLst>
+              <a:ext uri="{FF2B5EF4-FFF2-40B4-BE49-F238E27FC236}">
+                <a16:creationId xmlns:a16="http://schemas.microsoft.com/office/drawing/2014/main" id="{19AFF651-786E-4E02-8CAA-9FF660759F1A}"/>
+              </a:ext>
+            </a:extLst>
+          </p:cNvPr>
+          <p:cNvCxnSpPr>
+            <a:stCxn id="23" idx="0"/>
+            <a:endCxn id="19" idx="3"/>
+          </p:cNvCxnSpPr>
+          <p:nvPr/>
+        </p:nvCxnSpPr>
+        <p:spPr>
+          <a:xfrm rot="16200000" flipV="1">
+            <a:off x="6647113" y="1404411"/>
+            <a:ext cx="1775664" cy="792151"/>
+          </a:xfrm>
+          <a:prstGeom prst="curvedConnector2">
+            <a:avLst/>
+          </a:prstGeom>
+          <a:ln>
+            <a:tailEnd type="triangle"/>
+          </a:ln>
+        </p:spPr>
+        <p:style>
+          <a:lnRef idx="1">
+            <a:schemeClr val="accent1"/>
+          </a:lnRef>
+          <a:fillRef idx="0">
+            <a:schemeClr val="accent1"/>
+          </a:fillRef>
+          <a:effectRef idx="0">
+            <a:schemeClr val="accent1"/>
+          </a:effectRef>
+          <a:fontRef idx="minor">
+            <a:schemeClr val="tx1"/>
+          </a:fontRef>
+        </p:style>
+      </p:cxnSp>
+      <p:cxnSp>
+        <p:nvCxnSpPr>
+          <p:cNvPr id="35" name="Connector: Curved 34">
+            <a:extLst>
+              <a:ext uri="{FF2B5EF4-FFF2-40B4-BE49-F238E27FC236}">
+                <a16:creationId xmlns:a16="http://schemas.microsoft.com/office/drawing/2014/main" id="{EF91726F-B4A2-48D0-BE68-1FE5EA6CA949}"/>
+              </a:ext>
+            </a:extLst>
+          </p:cNvPr>
+          <p:cNvCxnSpPr>
+            <a:stCxn id="23" idx="0"/>
+            <a:endCxn id="22" idx="1"/>
+          </p:cNvCxnSpPr>
+          <p:nvPr/>
+        </p:nvCxnSpPr>
+        <p:spPr>
+          <a:xfrm rot="5400000" flipH="1" flipV="1">
+            <a:off x="8025688" y="2122069"/>
+            <a:ext cx="471583" cy="660919"/>
+          </a:xfrm>
+          <a:prstGeom prst="curvedConnector2">
+            <a:avLst/>
+          </a:prstGeom>
+          <a:ln>
+            <a:tailEnd type="triangle"/>
+          </a:ln>
+        </p:spPr>
+        <p:style>
+          <a:lnRef idx="1">
+            <a:schemeClr val="accent2"/>
+          </a:lnRef>
+          <a:fillRef idx="0">
+            <a:schemeClr val="accent2"/>
+          </a:fillRef>
+          <a:effectRef idx="0">
+            <a:schemeClr val="accent2"/>
+          </a:effectRef>
+          <a:fontRef idx="minor">
+            <a:schemeClr val="tx1"/>
+          </a:fontRef>
+        </p:style>
+      </p:cxnSp>
+    </p:spTree>
+    <p:extLst>
+      <p:ext uri="{BB962C8B-B14F-4D97-AF65-F5344CB8AC3E}">
+        <p14:creationId xmlns:p14="http://schemas.microsoft.com/office/powerpoint/2010/main" val="2293893576"/>
+      </p:ext>
+    </p:extLst>
+  </p:cSld>
+  <p:clrMapOvr>
+    <a:masterClrMapping/>
+  </p:clrMapOvr>
+</p:sld>
+</file>
+
+<file path=ppt/slides/slide6.xml><?xml version="1.0" encoding="utf-8"?>
+<p:sld xmlns:a="http://schemas.openxmlformats.org/drawingml/2006/main" xmlns:r="http://schemas.openxmlformats.org/officeDocument/2006/relationships" xmlns:p="http://schemas.openxmlformats.org/presentationml/2006/main">
+  <p:cSld>
+    <p:spTree>
+      <p:nvGrpSpPr>
+        <p:cNvPr id="1" name=""/>
+        <p:cNvGrpSpPr/>
+        <p:nvPr/>
+      </p:nvGrpSpPr>
+      <p:grpSpPr>
+        <a:xfrm>
+          <a:off x="0" y="0"/>
+          <a:ext cx="0" cy="0"/>
+          <a:chOff x="0" y="0"/>
+          <a:chExt cx="0" cy="0"/>
+        </a:xfrm>
+      </p:grpSpPr>
+      <p:sp>
+        <p:nvSpPr>
+          <p:cNvPr id="2" name="Title 1">
+            <a:extLst>
+              <a:ext uri="{FF2B5EF4-FFF2-40B4-BE49-F238E27FC236}">
+                <a16:creationId xmlns:a16="http://schemas.microsoft.com/office/drawing/2014/main" id="{59E9C46E-0E6C-487F-8782-A5F368C90A27}"/>
+              </a:ext>
+            </a:extLst>
+          </p:cNvPr>
+          <p:cNvSpPr>
+            <a:spLocks noGrp="1"/>
+          </p:cNvSpPr>
+          <p:nvPr>
+            <p:ph type="title"/>
+          </p:nvPr>
+        </p:nvSpPr>
+        <p:spPr>
+          <a:xfrm>
+            <a:off x="152400" y="1234"/>
+            <a:ext cx="5597450" cy="1325563"/>
+          </a:xfrm>
+        </p:spPr>
+        <p:txBody>
+          <a:bodyPr/>
+          <a:lstStyle/>
+          <a:p>
+            <a:r>
+              <a:rPr lang="en-US" dirty="0"/>
+              <a:t>Binding Types in UI5</a:t>
+            </a:r>
+          </a:p>
+        </p:txBody>
+      </p:sp>
+      <p:grpSp>
+        <p:nvGrpSpPr>
+          <p:cNvPr id="81" name="Group 80">
+            <a:extLst>
+              <a:ext uri="{FF2B5EF4-FFF2-40B4-BE49-F238E27FC236}">
+                <a16:creationId xmlns:a16="http://schemas.microsoft.com/office/drawing/2014/main" id="{6801B01C-9BC0-4278-BC68-58EC39435E4D}"/>
+              </a:ext>
+            </a:extLst>
+          </p:cNvPr>
+          <p:cNvGrpSpPr/>
+          <p:nvPr/>
+        </p:nvGrpSpPr>
+        <p:grpSpPr>
+          <a:xfrm>
+            <a:off x="606487" y="1209677"/>
+            <a:ext cx="9144003" cy="905067"/>
+            <a:chOff x="606487" y="1209677"/>
+            <a:chExt cx="9144003" cy="905067"/>
+          </a:xfrm>
+        </p:grpSpPr>
+        <p:sp>
+          <p:nvSpPr>
+            <p:cNvPr id="24" name="Flowchart: Direct Access Storage 23">
+              <a:extLst>
+                <a:ext uri="{FF2B5EF4-FFF2-40B4-BE49-F238E27FC236}">
+                  <a16:creationId xmlns:a16="http://schemas.microsoft.com/office/drawing/2014/main" id="{4597D822-AF3D-41A6-A912-0F2F688A17EB}"/>
+                </a:ext>
+              </a:extLst>
+            </p:cNvPr>
+            <p:cNvSpPr/>
+            <p:nvPr/>
+          </p:nvSpPr>
+          <p:spPr>
+            <a:xfrm>
+              <a:off x="606487" y="1209677"/>
+              <a:ext cx="1474236" cy="830425"/>
+            </a:xfrm>
+            <a:prstGeom prst="flowChartMagneticDrum">
+              <a:avLst/>
+            </a:prstGeom>
+          </p:spPr>
+          <p:style>
+            <a:lnRef idx="2">
+              <a:schemeClr val="accent6">
+                <a:shade val="50000"/>
+              </a:schemeClr>
+            </a:lnRef>
+            <a:fillRef idx="1">
+              <a:schemeClr val="accent6"/>
+            </a:fillRef>
+            <a:effectRef idx="0">
+              <a:schemeClr val="accent6"/>
+            </a:effectRef>
+            <a:fontRef idx="minor">
+              <a:schemeClr val="lt1"/>
+            </a:fontRef>
+          </p:style>
+          <p:txBody>
+            <a:bodyPr rtlCol="0" anchor="ctr"/>
+            <a:lstStyle/>
+            <a:p>
+              <a:pPr algn="ctr"/>
+              <a:r>
+                <a:rPr lang="en-US" sz="1400" dirty="0"/>
+                <a:t>OData</a:t>
+              </a:r>
+            </a:p>
+          </p:txBody>
+        </p:sp>
+        <p:sp>
+          <p:nvSpPr>
+            <p:cNvPr id="26" name="Rectangle: Rounded Corners 25">
+              <a:extLst>
+                <a:ext uri="{FF2B5EF4-FFF2-40B4-BE49-F238E27FC236}">
+                  <a16:creationId xmlns:a16="http://schemas.microsoft.com/office/drawing/2014/main" id="{29E1CF89-2DC4-4332-9249-8D2CAF7ACC2F}"/>
+                </a:ext>
+              </a:extLst>
+            </p:cNvPr>
+            <p:cNvSpPr/>
+            <p:nvPr/>
+          </p:nvSpPr>
+          <p:spPr>
+            <a:xfrm>
+              <a:off x="4133461" y="1209677"/>
+              <a:ext cx="1747935" cy="905067"/>
+            </a:xfrm>
+            <a:prstGeom prst="roundRect">
+              <a:avLst>
+                <a:gd name="adj" fmla="val 8599"/>
+              </a:avLst>
+            </a:prstGeom>
+          </p:spPr>
+          <p:style>
+            <a:lnRef idx="2">
+              <a:schemeClr val="accent6"/>
+            </a:lnRef>
+            <a:fillRef idx="1">
+              <a:schemeClr val="lt1"/>
+            </a:fillRef>
+            <a:effectRef idx="0">
+              <a:schemeClr val="accent6"/>
+            </a:effectRef>
+            <a:fontRef idx="minor">
+              <a:schemeClr val="dk1"/>
+            </a:fontRef>
+          </p:style>
+          <p:txBody>
+            <a:bodyPr rtlCol="0" anchor="ctr"/>
+            <a:lstStyle/>
+            <a:p>
+              <a:pPr algn="ctr"/>
+              <a:r>
+                <a:rPr lang="en-US" dirty="0"/>
+                <a:t>OData Model</a:t>
+              </a:r>
+            </a:p>
+          </p:txBody>
+        </p:sp>
+        <p:sp>
+          <p:nvSpPr>
+            <p:cNvPr id="28" name="Rectangle 27">
+              <a:extLst>
+                <a:ext uri="{FF2B5EF4-FFF2-40B4-BE49-F238E27FC236}">
+                  <a16:creationId xmlns:a16="http://schemas.microsoft.com/office/drawing/2014/main" id="{F0422CF2-9579-464E-B21A-6E2D9CF05CE9}"/>
+                </a:ext>
+              </a:extLst>
+            </p:cNvPr>
+            <p:cNvSpPr/>
+            <p:nvPr/>
+          </p:nvSpPr>
+          <p:spPr>
+            <a:xfrm>
+              <a:off x="8061649" y="1209677"/>
+              <a:ext cx="1688841" cy="905067"/>
+            </a:xfrm>
+            <a:prstGeom prst="rect">
+              <a:avLst/>
+            </a:prstGeom>
+          </p:spPr>
+          <p:style>
+            <a:lnRef idx="3">
+              <a:schemeClr val="lt1"/>
+            </a:lnRef>
+            <a:fillRef idx="1">
+              <a:schemeClr val="dk1"/>
+            </a:fillRef>
+            <a:effectRef idx="1">
+              <a:schemeClr val="dk1"/>
+            </a:effectRef>
+            <a:fontRef idx="minor">
+              <a:schemeClr val="lt1"/>
+            </a:fontRef>
+          </p:style>
+          <p:txBody>
+            <a:bodyPr rtlCol="0" anchor="ctr"/>
+            <a:lstStyle/>
+            <a:p>
+              <a:pPr algn="ctr"/>
+              <a:r>
+                <a:rPr lang="en-US" dirty="0"/>
+                <a:t>View</a:t>
+              </a:r>
+            </a:p>
+          </p:txBody>
+        </p:sp>
+        <p:grpSp>
+          <p:nvGrpSpPr>
+            <p:cNvPr id="52" name="Group 51">
+              <a:extLst>
+                <a:ext uri="{FF2B5EF4-FFF2-40B4-BE49-F238E27FC236}">
+                  <a16:creationId xmlns:a16="http://schemas.microsoft.com/office/drawing/2014/main" id="{8FB24D07-6FB9-4D6A-83C8-FDC7B71E0737}"/>
+                </a:ext>
+              </a:extLst>
+            </p:cNvPr>
+            <p:cNvGrpSpPr/>
+            <p:nvPr/>
+          </p:nvGrpSpPr>
+          <p:grpSpPr>
+            <a:xfrm>
+              <a:off x="5905498" y="1249449"/>
+              <a:ext cx="2124077" cy="833831"/>
+              <a:chOff x="5905498" y="1411374"/>
+              <a:chExt cx="2124077" cy="833831"/>
+            </a:xfrm>
+          </p:grpSpPr>
+          <p:sp>
+            <p:nvSpPr>
+              <p:cNvPr id="42" name="Arrow: Right 41">
+                <a:extLst>
+                  <a:ext uri="{FF2B5EF4-FFF2-40B4-BE49-F238E27FC236}">
+                    <a16:creationId xmlns:a16="http://schemas.microsoft.com/office/drawing/2014/main" id="{C926C972-B75E-4890-8A73-7332A979D53F}"/>
+                  </a:ext>
+                </a:extLst>
+              </p:cNvPr>
+              <p:cNvSpPr/>
+              <p:nvPr/>
+            </p:nvSpPr>
+            <p:spPr>
+              <a:xfrm>
+                <a:off x="5905500" y="1708862"/>
+                <a:ext cx="2124075" cy="238855"/>
+              </a:xfrm>
+              <a:prstGeom prst="rightArrow">
+                <a:avLst>
+                  <a:gd name="adj1" fmla="val 73438"/>
+                  <a:gd name="adj2" fmla="val 50000"/>
+                </a:avLst>
+              </a:prstGeom>
+            </p:spPr>
+            <p:style>
+              <a:lnRef idx="2">
+                <a:schemeClr val="accent2">
+                  <a:shade val="50000"/>
+                </a:schemeClr>
+              </a:lnRef>
+              <a:fillRef idx="1">
+                <a:schemeClr val="accent2"/>
+              </a:fillRef>
+              <a:effectRef idx="0">
+                <a:schemeClr val="accent2"/>
+              </a:effectRef>
+              <a:fontRef idx="minor">
+                <a:schemeClr val="lt1"/>
+              </a:fontRef>
+            </p:style>
+            <p:txBody>
+              <a:bodyPr rtlCol="0" anchor="ctr"/>
+              <a:lstStyle/>
+              <a:p>
+                <a:pPr algn="ctr"/>
+                <a:r>
+                  <a:rPr lang="en-US" sz="1400" dirty="0"/>
+                  <a:t>One-Way</a:t>
+                </a:r>
+              </a:p>
+            </p:txBody>
+          </p:sp>
+          <p:sp>
+            <p:nvSpPr>
+              <p:cNvPr id="43" name="Arrow: Right 42">
+                <a:extLst>
+                  <a:ext uri="{FF2B5EF4-FFF2-40B4-BE49-F238E27FC236}">
+                    <a16:creationId xmlns:a16="http://schemas.microsoft.com/office/drawing/2014/main" id="{C4EA4717-6472-4D04-BCB8-C488C568B9CB}"/>
+                  </a:ext>
+                </a:extLst>
+              </p:cNvPr>
+              <p:cNvSpPr/>
+              <p:nvPr/>
+            </p:nvSpPr>
+            <p:spPr>
+              <a:xfrm>
+                <a:off x="5905500" y="2006350"/>
+                <a:ext cx="2124075" cy="238855"/>
+              </a:xfrm>
+              <a:prstGeom prst="rightArrow">
+                <a:avLst>
+                  <a:gd name="adj1" fmla="val 73438"/>
+                  <a:gd name="adj2" fmla="val 50000"/>
+                </a:avLst>
+              </a:prstGeom>
+            </p:spPr>
+            <p:style>
+              <a:lnRef idx="2">
+                <a:schemeClr val="accent5">
+                  <a:shade val="50000"/>
+                </a:schemeClr>
+              </a:lnRef>
+              <a:fillRef idx="1">
+                <a:schemeClr val="accent5"/>
+              </a:fillRef>
+              <a:effectRef idx="0">
+                <a:schemeClr val="accent5"/>
+              </a:effectRef>
+              <a:fontRef idx="minor">
+                <a:schemeClr val="lt1"/>
+              </a:fontRef>
+            </p:style>
+            <p:txBody>
+              <a:bodyPr rtlCol="0" anchor="ctr"/>
+              <a:lstStyle/>
+              <a:p>
+                <a:pPr algn="ctr"/>
+                <a:r>
+                  <a:rPr lang="en-US" sz="1400" dirty="0"/>
+                  <a:t>One-Time</a:t>
+                </a:r>
+              </a:p>
+            </p:txBody>
+          </p:sp>
+          <p:grpSp>
+            <p:nvGrpSpPr>
+              <p:cNvPr id="51" name="Group 50">
+                <a:extLst>
+                  <a:ext uri="{FF2B5EF4-FFF2-40B4-BE49-F238E27FC236}">
+                    <a16:creationId xmlns:a16="http://schemas.microsoft.com/office/drawing/2014/main" id="{6DBE91C9-3D12-41E2-895B-6E63DD3C6AB3}"/>
+                  </a:ext>
+                </a:extLst>
+              </p:cNvPr>
+              <p:cNvGrpSpPr/>
+              <p:nvPr/>
+            </p:nvGrpSpPr>
+            <p:grpSpPr>
+              <a:xfrm>
+                <a:off x="5905498" y="1411374"/>
+                <a:ext cx="2124077" cy="238855"/>
+                <a:chOff x="5905498" y="1411374"/>
+                <a:chExt cx="2124077" cy="238855"/>
+              </a:xfrm>
+            </p:grpSpPr>
+            <p:sp>
+              <p:nvSpPr>
+                <p:cNvPr id="47" name="Arrow: Right 46">
+                  <a:extLst>
+                    <a:ext uri="{FF2B5EF4-FFF2-40B4-BE49-F238E27FC236}">
+                      <a16:creationId xmlns:a16="http://schemas.microsoft.com/office/drawing/2014/main" id="{97EFD451-667A-4C4B-94AB-B857CE77E1FF}"/>
+                    </a:ext>
+                  </a:extLst>
+                </p:cNvPr>
+                <p:cNvSpPr/>
+                <p:nvPr/>
+              </p:nvSpPr>
+              <p:spPr>
+                <a:xfrm flipH="1">
+                  <a:off x="5905498" y="1411374"/>
+                  <a:ext cx="2006599" cy="238855"/>
+                </a:xfrm>
+                <a:prstGeom prst="rightArrow">
+                  <a:avLst>
+                    <a:gd name="adj1" fmla="val 73438"/>
+                    <a:gd name="adj2" fmla="val 50000"/>
+                  </a:avLst>
+                </a:prstGeom>
+              </p:spPr>
+              <p:style>
+                <a:lnRef idx="2">
+                  <a:schemeClr val="accent5">
+                    <a:shade val="50000"/>
+                  </a:schemeClr>
+                </a:lnRef>
+                <a:fillRef idx="1">
+                  <a:schemeClr val="accent5"/>
+                </a:fillRef>
+                <a:effectRef idx="0">
+                  <a:schemeClr val="accent5"/>
+                </a:effectRef>
+                <a:fontRef idx="minor">
+                  <a:schemeClr val="lt1"/>
+                </a:fontRef>
+              </p:style>
+              <p:txBody>
+                <a:bodyPr rtlCol="0" anchor="ctr"/>
+                <a:lstStyle/>
+                <a:p>
+                  <a:pPr algn="ctr"/>
+                  <a:endParaRPr lang="en-US" sz="1400" dirty="0"/>
+                </a:p>
+              </p:txBody>
+            </p:sp>
+            <p:sp>
+              <p:nvSpPr>
+                <p:cNvPr id="44" name="Arrow: Right 43">
+                  <a:extLst>
+                    <a:ext uri="{FF2B5EF4-FFF2-40B4-BE49-F238E27FC236}">
+                      <a16:creationId xmlns:a16="http://schemas.microsoft.com/office/drawing/2014/main" id="{AB291CBB-A93E-48C6-A16E-2F93D605A662}"/>
+                    </a:ext>
+                  </a:extLst>
+                </p:cNvPr>
+                <p:cNvSpPr/>
+                <p:nvPr/>
+              </p:nvSpPr>
+              <p:spPr>
+                <a:xfrm>
+                  <a:off x="6022975" y="1411374"/>
+                  <a:ext cx="2006600" cy="238855"/>
+                </a:xfrm>
+                <a:prstGeom prst="rightArrow">
+                  <a:avLst>
+                    <a:gd name="adj1" fmla="val 73438"/>
+                    <a:gd name="adj2" fmla="val 50000"/>
+                  </a:avLst>
+                </a:prstGeom>
+              </p:spPr>
+              <p:style>
+                <a:lnRef idx="2">
+                  <a:schemeClr val="accent5">
+                    <a:shade val="50000"/>
+                  </a:schemeClr>
+                </a:lnRef>
+                <a:fillRef idx="1">
+                  <a:schemeClr val="accent5"/>
+                </a:fillRef>
+                <a:effectRef idx="0">
+                  <a:schemeClr val="accent5"/>
+                </a:effectRef>
+                <a:fontRef idx="minor">
+                  <a:schemeClr val="lt1"/>
+                </a:fontRef>
+              </p:style>
+              <p:txBody>
+                <a:bodyPr rtlCol="0" anchor="ctr"/>
+                <a:lstStyle/>
+                <a:p>
+                  <a:pPr algn="ctr"/>
+                  <a:r>
+                    <a:rPr lang="en-US" sz="1400" dirty="0"/>
+                    <a:t>Two-Way</a:t>
+                  </a:r>
+                </a:p>
+              </p:txBody>
+            </p:sp>
+            <p:sp>
+              <p:nvSpPr>
+                <p:cNvPr id="50" name="Rectangle 49">
+                  <a:extLst>
+                    <a:ext uri="{FF2B5EF4-FFF2-40B4-BE49-F238E27FC236}">
+                      <a16:creationId xmlns:a16="http://schemas.microsoft.com/office/drawing/2014/main" id="{227341FC-B70B-426E-8722-84A2031FEF75}"/>
+                    </a:ext>
+                  </a:extLst>
+                </p:cNvPr>
+                <p:cNvSpPr/>
+                <p:nvPr/>
+              </p:nvSpPr>
+              <p:spPr>
+                <a:xfrm>
+                  <a:off x="5998873" y="1458129"/>
+                  <a:ext cx="206375" cy="148421"/>
+                </a:xfrm>
+                <a:prstGeom prst="rect">
+                  <a:avLst/>
+                </a:prstGeom>
+                <a:solidFill>
+                  <a:schemeClr val="accent5"/>
+                </a:solidFill>
+                <a:ln>
+                  <a:noFill/>
+                </a:ln>
+              </p:spPr>
+              <p:style>
+                <a:lnRef idx="2">
+                  <a:schemeClr val="accent1">
+                    <a:shade val="50000"/>
+                  </a:schemeClr>
+                </a:lnRef>
+                <a:fillRef idx="1">
+                  <a:schemeClr val="accent1"/>
+                </a:fillRef>
+                <a:effectRef idx="0">
+                  <a:schemeClr val="accent1"/>
+                </a:effectRef>
+                <a:fontRef idx="minor">
+                  <a:schemeClr val="lt1"/>
+                </a:fontRef>
+              </p:style>
+              <p:txBody>
+                <a:bodyPr rtlCol="0" anchor="ctr"/>
+                <a:lstStyle/>
+                <a:p>
+                  <a:pPr algn="ctr"/>
+                  <a:endParaRPr lang="en-US"/>
+                </a:p>
+              </p:txBody>
+            </p:sp>
+          </p:grpSp>
+        </p:grpSp>
+        <p:sp>
+          <p:nvSpPr>
+            <p:cNvPr id="77" name="Arrow: Left-Right 76">
+              <a:extLst>
+                <a:ext uri="{FF2B5EF4-FFF2-40B4-BE49-F238E27FC236}">
+                  <a16:creationId xmlns:a16="http://schemas.microsoft.com/office/drawing/2014/main" id="{420F5409-3E3F-4350-9335-53BF0DE30EEC}"/>
+                </a:ext>
+              </a:extLst>
+            </p:cNvPr>
+            <p:cNvSpPr/>
+            <p:nvPr/>
+          </p:nvSpPr>
+          <p:spPr>
+            <a:xfrm>
+              <a:off x="2088790" y="1434291"/>
+              <a:ext cx="2028634" cy="381195"/>
+            </a:xfrm>
+            <a:prstGeom prst="leftRightArrow">
+              <a:avLst/>
+            </a:prstGeom>
+          </p:spPr>
+          <p:style>
+            <a:lnRef idx="2">
+              <a:schemeClr val="accent3">
+                <a:shade val="50000"/>
+              </a:schemeClr>
+            </a:lnRef>
+            <a:fillRef idx="1">
+              <a:schemeClr val="accent3"/>
+            </a:fillRef>
+            <a:effectRef idx="0">
+              <a:schemeClr val="accent3"/>
+            </a:effectRef>
+            <a:fontRef idx="minor">
+              <a:schemeClr val="lt1"/>
+            </a:fontRef>
+          </p:style>
+          <p:txBody>
+            <a:bodyPr rtlCol="0" anchor="ctr"/>
+            <a:lstStyle/>
+            <a:p>
+              <a:pPr algn="ctr"/>
+              <a:endParaRPr lang="en-US" sz="1400" dirty="0"/>
+            </a:p>
+          </p:txBody>
+        </p:sp>
+      </p:grpSp>
+      <p:grpSp>
+        <p:nvGrpSpPr>
+          <p:cNvPr id="82" name="Group 81">
+            <a:extLst>
+              <a:ext uri="{FF2B5EF4-FFF2-40B4-BE49-F238E27FC236}">
+                <a16:creationId xmlns:a16="http://schemas.microsoft.com/office/drawing/2014/main" id="{6CE9D545-6FBD-450E-9BB4-16584D2E05B6}"/>
+              </a:ext>
+            </a:extLst>
+          </p:cNvPr>
+          <p:cNvGrpSpPr/>
+          <p:nvPr/>
+        </p:nvGrpSpPr>
+        <p:grpSpPr>
+          <a:xfrm>
+            <a:off x="606487" y="2460173"/>
+            <a:ext cx="9144003" cy="1250302"/>
+            <a:chOff x="606487" y="2460173"/>
+            <a:chExt cx="9144003" cy="1250302"/>
+          </a:xfrm>
+        </p:grpSpPr>
+        <p:sp>
+          <p:nvSpPr>
+            <p:cNvPr id="38" name="Rectangle 37">
+              <a:extLst>
+                <a:ext uri="{FF2B5EF4-FFF2-40B4-BE49-F238E27FC236}">
+                  <a16:creationId xmlns:a16="http://schemas.microsoft.com/office/drawing/2014/main" id="{2DA397B6-9670-4D4E-B6AE-247F0E329279}"/>
+                </a:ext>
+              </a:extLst>
+            </p:cNvPr>
+            <p:cNvSpPr/>
+            <p:nvPr/>
+          </p:nvSpPr>
+          <p:spPr>
+            <a:xfrm>
+              <a:off x="8061649" y="2632790"/>
+              <a:ext cx="1688841" cy="905067"/>
+            </a:xfrm>
+            <a:prstGeom prst="rect">
+              <a:avLst/>
+            </a:prstGeom>
+          </p:spPr>
+          <p:style>
+            <a:lnRef idx="3">
+              <a:schemeClr val="lt1"/>
+            </a:lnRef>
+            <a:fillRef idx="1">
+              <a:schemeClr val="dk1"/>
+            </a:fillRef>
+            <a:effectRef idx="1">
+              <a:schemeClr val="dk1"/>
+            </a:effectRef>
+            <a:fontRef idx="minor">
+              <a:schemeClr val="lt1"/>
+            </a:fontRef>
+          </p:style>
+          <p:txBody>
+            <a:bodyPr rtlCol="0" anchor="ctr"/>
+            <a:lstStyle/>
+            <a:p>
+              <a:pPr algn="ctr"/>
+              <a:r>
+                <a:rPr lang="en-US" dirty="0"/>
+                <a:t>View</a:t>
+              </a:r>
+            </a:p>
+          </p:txBody>
+        </p:sp>
+        <p:grpSp>
+          <p:nvGrpSpPr>
+            <p:cNvPr id="53" name="Group 52">
+              <a:extLst>
+                <a:ext uri="{FF2B5EF4-FFF2-40B4-BE49-F238E27FC236}">
+                  <a16:creationId xmlns:a16="http://schemas.microsoft.com/office/drawing/2014/main" id="{AB313262-949C-4F90-AD45-9B977BCD0CCE}"/>
+                </a:ext>
+              </a:extLst>
+            </p:cNvPr>
+            <p:cNvGrpSpPr/>
+            <p:nvPr/>
+          </p:nvGrpSpPr>
+          <p:grpSpPr>
+            <a:xfrm>
+              <a:off x="5905498" y="2668407"/>
+              <a:ext cx="2124077" cy="833831"/>
+              <a:chOff x="5905498" y="1411374"/>
+              <a:chExt cx="2124077" cy="833831"/>
+            </a:xfrm>
+          </p:grpSpPr>
+          <p:sp>
+            <p:nvSpPr>
+              <p:cNvPr id="54" name="Arrow: Right 53">
+                <a:extLst>
+                  <a:ext uri="{FF2B5EF4-FFF2-40B4-BE49-F238E27FC236}">
+                    <a16:creationId xmlns:a16="http://schemas.microsoft.com/office/drawing/2014/main" id="{C0358CF1-5C47-4CC8-A444-EA989687C44C}"/>
+                  </a:ext>
+                </a:extLst>
+              </p:cNvPr>
+              <p:cNvSpPr/>
+              <p:nvPr/>
+            </p:nvSpPr>
+            <p:spPr>
+              <a:xfrm>
+                <a:off x="5905500" y="1708862"/>
+                <a:ext cx="2124075" cy="238855"/>
+              </a:xfrm>
+              <a:prstGeom prst="rightArrow">
+                <a:avLst>
+                  <a:gd name="adj1" fmla="val 73438"/>
+                  <a:gd name="adj2" fmla="val 50000"/>
+                </a:avLst>
+              </a:prstGeom>
+            </p:spPr>
+            <p:style>
+              <a:lnRef idx="2">
+                <a:schemeClr val="accent5">
+                  <a:shade val="50000"/>
+                </a:schemeClr>
+              </a:lnRef>
+              <a:fillRef idx="1">
+                <a:schemeClr val="accent5"/>
+              </a:fillRef>
+              <a:effectRef idx="0">
+                <a:schemeClr val="accent5"/>
+              </a:effectRef>
+              <a:fontRef idx="minor">
+                <a:schemeClr val="lt1"/>
+              </a:fontRef>
+            </p:style>
+            <p:txBody>
+              <a:bodyPr rtlCol="0" anchor="ctr"/>
+              <a:lstStyle/>
+              <a:p>
+                <a:pPr algn="ctr"/>
+                <a:r>
+                  <a:rPr lang="en-US" sz="1400" dirty="0"/>
+                  <a:t>One-Way</a:t>
+                </a:r>
+              </a:p>
+            </p:txBody>
+          </p:sp>
+          <p:sp>
+            <p:nvSpPr>
+              <p:cNvPr id="55" name="Arrow: Right 54">
+                <a:extLst>
+                  <a:ext uri="{FF2B5EF4-FFF2-40B4-BE49-F238E27FC236}">
+                    <a16:creationId xmlns:a16="http://schemas.microsoft.com/office/drawing/2014/main" id="{DA47E005-FC6D-4330-B24B-F8F0142E6D5B}"/>
+                  </a:ext>
+                </a:extLst>
+              </p:cNvPr>
+              <p:cNvSpPr/>
+              <p:nvPr/>
+            </p:nvSpPr>
+            <p:spPr>
+              <a:xfrm>
+                <a:off x="5905500" y="2006350"/>
+                <a:ext cx="2124075" cy="238855"/>
+              </a:xfrm>
+              <a:prstGeom prst="rightArrow">
+                <a:avLst>
+                  <a:gd name="adj1" fmla="val 73438"/>
+                  <a:gd name="adj2" fmla="val 50000"/>
+                </a:avLst>
+              </a:prstGeom>
+            </p:spPr>
+            <p:style>
+              <a:lnRef idx="2">
+                <a:schemeClr val="accent5">
+                  <a:shade val="50000"/>
+                </a:schemeClr>
+              </a:lnRef>
+              <a:fillRef idx="1">
+                <a:schemeClr val="accent5"/>
+              </a:fillRef>
+              <a:effectRef idx="0">
+                <a:schemeClr val="accent5"/>
+              </a:effectRef>
+              <a:fontRef idx="minor">
+                <a:schemeClr val="lt1"/>
+              </a:fontRef>
+            </p:style>
+            <p:txBody>
+              <a:bodyPr rtlCol="0" anchor="ctr"/>
+              <a:lstStyle/>
+              <a:p>
+                <a:pPr algn="ctr"/>
+                <a:r>
+                  <a:rPr lang="en-US" sz="1400" dirty="0"/>
+                  <a:t>One-Time</a:t>
+                </a:r>
+              </a:p>
+            </p:txBody>
+          </p:sp>
+          <p:grpSp>
+            <p:nvGrpSpPr>
+              <p:cNvPr id="56" name="Group 55">
+                <a:extLst>
+                  <a:ext uri="{FF2B5EF4-FFF2-40B4-BE49-F238E27FC236}">
+                    <a16:creationId xmlns:a16="http://schemas.microsoft.com/office/drawing/2014/main" id="{87A5FEE0-6D38-4F90-8CA6-6607BC389D6A}"/>
+                  </a:ext>
+                </a:extLst>
+              </p:cNvPr>
+              <p:cNvGrpSpPr/>
+              <p:nvPr/>
+            </p:nvGrpSpPr>
+            <p:grpSpPr>
+              <a:xfrm>
+                <a:off x="5905498" y="1411374"/>
+                <a:ext cx="2124077" cy="238855"/>
+                <a:chOff x="5905498" y="1411374"/>
+                <a:chExt cx="2124077" cy="238855"/>
+              </a:xfrm>
+            </p:grpSpPr>
+            <p:sp>
+              <p:nvSpPr>
+                <p:cNvPr id="57" name="Arrow: Right 56">
+                  <a:extLst>
+                    <a:ext uri="{FF2B5EF4-FFF2-40B4-BE49-F238E27FC236}">
+                      <a16:creationId xmlns:a16="http://schemas.microsoft.com/office/drawing/2014/main" id="{89F2AAF4-EFC0-4886-AE40-5BC871B2CDBD}"/>
+                    </a:ext>
+                  </a:extLst>
+                </p:cNvPr>
+                <p:cNvSpPr/>
+                <p:nvPr/>
+              </p:nvSpPr>
+              <p:spPr>
+                <a:xfrm flipH="1">
+                  <a:off x="5905498" y="1411374"/>
+                  <a:ext cx="2006599" cy="238855"/>
+                </a:xfrm>
+                <a:prstGeom prst="rightArrow">
+                  <a:avLst>
+                    <a:gd name="adj1" fmla="val 73438"/>
+                    <a:gd name="adj2" fmla="val 50000"/>
+                  </a:avLst>
+                </a:prstGeom>
+              </p:spPr>
+              <p:style>
+                <a:lnRef idx="2">
+                  <a:schemeClr val="accent2">
+                    <a:shade val="50000"/>
+                  </a:schemeClr>
+                </a:lnRef>
+                <a:fillRef idx="1">
+                  <a:schemeClr val="accent2"/>
+                </a:fillRef>
+                <a:effectRef idx="0">
+                  <a:schemeClr val="accent2"/>
+                </a:effectRef>
+                <a:fontRef idx="minor">
+                  <a:schemeClr val="lt1"/>
+                </a:fontRef>
+              </p:style>
+              <p:txBody>
+                <a:bodyPr rtlCol="0" anchor="ctr"/>
+                <a:lstStyle/>
+                <a:p>
+                  <a:pPr algn="ctr"/>
+                  <a:endParaRPr lang="en-US" sz="1400" dirty="0"/>
+                </a:p>
+              </p:txBody>
+            </p:sp>
+            <p:sp>
+              <p:nvSpPr>
+                <p:cNvPr id="58" name="Arrow: Right 57">
+                  <a:extLst>
+                    <a:ext uri="{FF2B5EF4-FFF2-40B4-BE49-F238E27FC236}">
+                      <a16:creationId xmlns:a16="http://schemas.microsoft.com/office/drawing/2014/main" id="{B2068DCC-831B-456C-A756-32564DBC8673}"/>
+                    </a:ext>
+                  </a:extLst>
+                </p:cNvPr>
+                <p:cNvSpPr/>
+                <p:nvPr/>
+              </p:nvSpPr>
+              <p:spPr>
+                <a:xfrm>
+                  <a:off x="6022975" y="1411374"/>
+                  <a:ext cx="2006600" cy="238855"/>
+                </a:xfrm>
+                <a:prstGeom prst="rightArrow">
+                  <a:avLst>
+                    <a:gd name="adj1" fmla="val 73438"/>
+                    <a:gd name="adj2" fmla="val 50000"/>
+                  </a:avLst>
+                </a:prstGeom>
+              </p:spPr>
+              <p:style>
+                <a:lnRef idx="2">
+                  <a:schemeClr val="accent2">
+                    <a:shade val="50000"/>
+                  </a:schemeClr>
+                </a:lnRef>
+                <a:fillRef idx="1">
+                  <a:schemeClr val="accent2"/>
+                </a:fillRef>
+                <a:effectRef idx="0">
+                  <a:schemeClr val="accent2"/>
+                </a:effectRef>
+                <a:fontRef idx="minor">
+                  <a:schemeClr val="lt1"/>
+                </a:fontRef>
+              </p:style>
+              <p:txBody>
+                <a:bodyPr rtlCol="0" anchor="ctr"/>
+                <a:lstStyle/>
+                <a:p>
+                  <a:pPr algn="ctr"/>
+                  <a:r>
+                    <a:rPr lang="en-US" sz="1400" dirty="0"/>
+                    <a:t>Two-Way</a:t>
+                  </a:r>
+                </a:p>
+              </p:txBody>
+            </p:sp>
+            <p:sp>
+              <p:nvSpPr>
+                <p:cNvPr id="59" name="Rectangle 58">
+                  <a:extLst>
+                    <a:ext uri="{FF2B5EF4-FFF2-40B4-BE49-F238E27FC236}">
+                      <a16:creationId xmlns:a16="http://schemas.microsoft.com/office/drawing/2014/main" id="{33EE1915-E97A-4228-98F7-1D782983BCD1}"/>
+                    </a:ext>
+                  </a:extLst>
+                </p:cNvPr>
+                <p:cNvSpPr/>
+                <p:nvPr/>
+              </p:nvSpPr>
+              <p:spPr>
+                <a:xfrm>
+                  <a:off x="6012772" y="1462892"/>
+                  <a:ext cx="206375" cy="144000"/>
+                </a:xfrm>
+                <a:prstGeom prst="rect">
+                  <a:avLst/>
+                </a:prstGeom>
+                <a:solidFill>
+                  <a:schemeClr val="accent2"/>
+                </a:solidFill>
+                <a:ln>
+                  <a:noFill/>
+                </a:ln>
+              </p:spPr>
+              <p:style>
+                <a:lnRef idx="2">
+                  <a:schemeClr val="accent1">
+                    <a:shade val="50000"/>
+                  </a:schemeClr>
+                </a:lnRef>
+                <a:fillRef idx="1">
+                  <a:schemeClr val="accent1"/>
+                </a:fillRef>
+                <a:effectRef idx="0">
+                  <a:schemeClr val="accent1"/>
+                </a:effectRef>
+                <a:fontRef idx="minor">
+                  <a:schemeClr val="lt1"/>
+                </a:fontRef>
+              </p:style>
+              <p:txBody>
+                <a:bodyPr rtlCol="0" anchor="ctr"/>
+                <a:lstStyle/>
+                <a:p>
+                  <a:pPr algn="ctr"/>
+                  <a:endParaRPr lang="en-US"/>
+                </a:p>
+              </p:txBody>
+            </p:sp>
+          </p:grpSp>
+        </p:grpSp>
+        <p:sp>
+          <p:nvSpPr>
+            <p:cNvPr id="67" name="Rectangle: Rounded Corners 66">
+              <a:extLst>
+                <a:ext uri="{FF2B5EF4-FFF2-40B4-BE49-F238E27FC236}">
+                  <a16:creationId xmlns:a16="http://schemas.microsoft.com/office/drawing/2014/main" id="{E0DB4571-51E9-40BA-8327-A5486AB24E90}"/>
+                </a:ext>
+              </a:extLst>
+            </p:cNvPr>
+            <p:cNvSpPr/>
+            <p:nvPr/>
+          </p:nvSpPr>
+          <p:spPr>
+            <a:xfrm>
+              <a:off x="4133460" y="2645414"/>
+              <a:ext cx="1747935" cy="905067"/>
+            </a:xfrm>
+            <a:prstGeom prst="roundRect">
+              <a:avLst>
+                <a:gd name="adj" fmla="val 8599"/>
+              </a:avLst>
+            </a:prstGeom>
+          </p:spPr>
+          <p:style>
+            <a:lnRef idx="2">
+              <a:schemeClr val="accent6"/>
+            </a:lnRef>
+            <a:fillRef idx="1">
+              <a:schemeClr val="lt1"/>
+            </a:fillRef>
+            <a:effectRef idx="0">
+              <a:schemeClr val="accent6"/>
+            </a:effectRef>
+            <a:fontRef idx="minor">
+              <a:schemeClr val="dk1"/>
+            </a:fontRef>
+          </p:style>
+          <p:txBody>
+            <a:bodyPr rtlCol="0" anchor="ctr"/>
+            <a:lstStyle/>
+            <a:p>
+              <a:pPr algn="ctr"/>
+              <a:r>
+                <a:rPr lang="en-US" dirty="0"/>
+                <a:t>JSON Model</a:t>
+              </a:r>
+            </a:p>
+          </p:txBody>
+        </p:sp>
+        <p:sp>
+          <p:nvSpPr>
+            <p:cNvPr id="78" name="Arrow: Left-Right 77">
+              <a:extLst>
+                <a:ext uri="{FF2B5EF4-FFF2-40B4-BE49-F238E27FC236}">
+                  <a16:creationId xmlns:a16="http://schemas.microsoft.com/office/drawing/2014/main" id="{8C8911AF-8AD0-416C-8D80-8A843EAB0B15}"/>
+                </a:ext>
+              </a:extLst>
+            </p:cNvPr>
+            <p:cNvSpPr/>
+            <p:nvPr/>
+          </p:nvSpPr>
+          <p:spPr>
+            <a:xfrm>
+              <a:off x="1875453" y="2894724"/>
+              <a:ext cx="2254899" cy="381195"/>
+            </a:xfrm>
+            <a:prstGeom prst="leftRightArrow">
+              <a:avLst/>
+            </a:prstGeom>
+            <a:ln>
+              <a:prstDash val="dash"/>
+            </a:ln>
+          </p:spPr>
+          <p:style>
+            <a:lnRef idx="2">
+              <a:schemeClr val="accent3">
+                <a:shade val="50000"/>
+              </a:schemeClr>
+            </a:lnRef>
+            <a:fillRef idx="1">
+              <a:schemeClr val="accent3"/>
+            </a:fillRef>
+            <a:effectRef idx="0">
+              <a:schemeClr val="accent3"/>
+            </a:effectRef>
+            <a:fontRef idx="minor">
+              <a:schemeClr val="lt1"/>
+            </a:fontRef>
+          </p:style>
+          <p:txBody>
+            <a:bodyPr rtlCol="0" anchor="ctr"/>
+            <a:lstStyle/>
+            <a:p>
+              <a:pPr algn="ctr"/>
+              <a:endParaRPr lang="en-US" sz="1400" dirty="0"/>
+            </a:p>
+          </p:txBody>
+        </p:sp>
+        <p:sp>
+          <p:nvSpPr>
+            <p:cNvPr id="32" name="Flowchart: Multidocument 31">
+              <a:extLst>
+                <a:ext uri="{FF2B5EF4-FFF2-40B4-BE49-F238E27FC236}">
+                  <a16:creationId xmlns:a16="http://schemas.microsoft.com/office/drawing/2014/main" id="{AA98E0D4-5576-415D-AC58-218F7F242E41}"/>
+                </a:ext>
+              </a:extLst>
+            </p:cNvPr>
+            <p:cNvSpPr/>
+            <p:nvPr/>
+          </p:nvSpPr>
+          <p:spPr>
+            <a:xfrm>
+              <a:off x="606487" y="2460173"/>
+              <a:ext cx="1474237" cy="1250302"/>
+            </a:xfrm>
+            <a:prstGeom prst="flowChartMultidocument">
+              <a:avLst/>
+            </a:prstGeom>
+          </p:spPr>
+          <p:style>
+            <a:lnRef idx="2">
+              <a:schemeClr val="accent4">
+                <a:shade val="50000"/>
+              </a:schemeClr>
+            </a:lnRef>
+            <a:fillRef idx="1">
+              <a:schemeClr val="accent4"/>
+            </a:fillRef>
+            <a:effectRef idx="0">
+              <a:schemeClr val="accent4"/>
+            </a:effectRef>
+            <a:fontRef idx="minor">
+              <a:schemeClr val="lt1"/>
+            </a:fontRef>
+          </p:style>
+          <p:txBody>
+            <a:bodyPr rtlCol="0" anchor="ctr"/>
+            <a:lstStyle/>
+            <a:p>
+              <a:pPr algn="ctr"/>
+              <a:r>
+                <a:rPr lang="en-US" sz="1400" dirty="0"/>
+                <a:t>JSON</a:t>
+              </a:r>
+            </a:p>
+          </p:txBody>
+        </p:sp>
+      </p:grpSp>
+      <p:grpSp>
+        <p:nvGrpSpPr>
+          <p:cNvPr id="83" name="Group 82">
+            <a:extLst>
+              <a:ext uri="{FF2B5EF4-FFF2-40B4-BE49-F238E27FC236}">
+                <a16:creationId xmlns:a16="http://schemas.microsoft.com/office/drawing/2014/main" id="{A2C4CB1E-FD38-490A-B144-5717F3BB7616}"/>
+              </a:ext>
+            </a:extLst>
+          </p:cNvPr>
+          <p:cNvGrpSpPr/>
+          <p:nvPr/>
+        </p:nvGrpSpPr>
+        <p:grpSpPr>
+          <a:xfrm>
+            <a:off x="606488" y="3968621"/>
+            <a:ext cx="9144002" cy="1250302"/>
+            <a:chOff x="606488" y="3968621"/>
+            <a:chExt cx="9144002" cy="1250302"/>
+          </a:xfrm>
+        </p:grpSpPr>
+        <p:sp>
+          <p:nvSpPr>
+            <p:cNvPr id="39" name="Rectangle 38">
+              <a:extLst>
+                <a:ext uri="{FF2B5EF4-FFF2-40B4-BE49-F238E27FC236}">
+                  <a16:creationId xmlns:a16="http://schemas.microsoft.com/office/drawing/2014/main" id="{9B8423B6-51F8-4FBD-8204-36377B9F299B}"/>
+                </a:ext>
+              </a:extLst>
+            </p:cNvPr>
+            <p:cNvSpPr/>
+            <p:nvPr/>
+          </p:nvSpPr>
+          <p:spPr>
+            <a:xfrm>
+              <a:off x="8061649" y="4141238"/>
+              <a:ext cx="1688841" cy="905067"/>
+            </a:xfrm>
+            <a:prstGeom prst="rect">
+              <a:avLst/>
+            </a:prstGeom>
+          </p:spPr>
+          <p:style>
+            <a:lnRef idx="3">
+              <a:schemeClr val="lt1"/>
+            </a:lnRef>
+            <a:fillRef idx="1">
+              <a:schemeClr val="dk1"/>
+            </a:fillRef>
+            <a:effectRef idx="1">
+              <a:schemeClr val="dk1"/>
+            </a:effectRef>
+            <a:fontRef idx="minor">
+              <a:schemeClr val="lt1"/>
+            </a:fontRef>
+          </p:style>
+          <p:txBody>
+            <a:bodyPr rtlCol="0" anchor="ctr"/>
+            <a:lstStyle/>
+            <a:p>
+              <a:pPr algn="ctr"/>
+              <a:r>
+                <a:rPr lang="en-US" dirty="0"/>
+                <a:t>View</a:t>
+              </a:r>
+            </a:p>
+          </p:txBody>
+        </p:sp>
+        <p:grpSp>
+          <p:nvGrpSpPr>
+            <p:cNvPr id="60" name="Group 59">
+              <a:extLst>
+                <a:ext uri="{FF2B5EF4-FFF2-40B4-BE49-F238E27FC236}">
+                  <a16:creationId xmlns:a16="http://schemas.microsoft.com/office/drawing/2014/main" id="{4B254D67-0EF9-4609-8CDF-68BBE553188D}"/>
+                </a:ext>
+              </a:extLst>
+            </p:cNvPr>
+            <p:cNvGrpSpPr/>
+            <p:nvPr/>
+          </p:nvGrpSpPr>
+          <p:grpSpPr>
+            <a:xfrm>
+              <a:off x="5905498" y="4172340"/>
+              <a:ext cx="2124077" cy="833831"/>
+              <a:chOff x="5905498" y="1411374"/>
+              <a:chExt cx="2124077" cy="833831"/>
+            </a:xfrm>
+          </p:grpSpPr>
+          <p:sp>
+            <p:nvSpPr>
+              <p:cNvPr id="61" name="Arrow: Right 60">
+                <a:extLst>
+                  <a:ext uri="{FF2B5EF4-FFF2-40B4-BE49-F238E27FC236}">
+                    <a16:creationId xmlns:a16="http://schemas.microsoft.com/office/drawing/2014/main" id="{CFC3D565-B90D-4FC7-9A1F-D1BC90A43BD0}"/>
+                  </a:ext>
+                </a:extLst>
+              </p:cNvPr>
+              <p:cNvSpPr/>
+              <p:nvPr/>
+            </p:nvSpPr>
+            <p:spPr>
+              <a:xfrm>
+                <a:off x="5905500" y="1708862"/>
+                <a:ext cx="2124075" cy="238855"/>
+              </a:xfrm>
+              <a:prstGeom prst="rightArrow">
+                <a:avLst>
+                  <a:gd name="adj1" fmla="val 73438"/>
+                  <a:gd name="adj2" fmla="val 50000"/>
+                </a:avLst>
+              </a:prstGeom>
+            </p:spPr>
+            <p:style>
+              <a:lnRef idx="2">
+                <a:schemeClr val="accent5">
+                  <a:shade val="50000"/>
+                </a:schemeClr>
+              </a:lnRef>
+              <a:fillRef idx="1">
+                <a:schemeClr val="accent5"/>
+              </a:fillRef>
+              <a:effectRef idx="0">
+                <a:schemeClr val="accent5"/>
+              </a:effectRef>
+              <a:fontRef idx="minor">
+                <a:schemeClr val="lt1"/>
+              </a:fontRef>
+            </p:style>
+            <p:txBody>
+              <a:bodyPr rtlCol="0" anchor="ctr"/>
+              <a:lstStyle/>
+              <a:p>
+                <a:pPr algn="ctr"/>
+                <a:r>
+                  <a:rPr lang="en-US" sz="1400" dirty="0"/>
+                  <a:t>One-Way</a:t>
+                </a:r>
+              </a:p>
+            </p:txBody>
+          </p:sp>
+          <p:sp>
+            <p:nvSpPr>
+              <p:cNvPr id="62" name="Arrow: Right 61">
+                <a:extLst>
+                  <a:ext uri="{FF2B5EF4-FFF2-40B4-BE49-F238E27FC236}">
+                    <a16:creationId xmlns:a16="http://schemas.microsoft.com/office/drawing/2014/main" id="{C4696B86-DB26-4FFC-B5A1-2462B62883A4}"/>
+                  </a:ext>
+                </a:extLst>
+              </p:cNvPr>
+              <p:cNvSpPr/>
+              <p:nvPr/>
+            </p:nvSpPr>
+            <p:spPr>
+              <a:xfrm>
+                <a:off x="5905500" y="2006350"/>
+                <a:ext cx="2124075" cy="238855"/>
+              </a:xfrm>
+              <a:prstGeom prst="rightArrow">
+                <a:avLst>
+                  <a:gd name="adj1" fmla="val 73438"/>
+                  <a:gd name="adj2" fmla="val 50000"/>
+                </a:avLst>
+              </a:prstGeom>
+            </p:spPr>
+            <p:style>
+              <a:lnRef idx="2">
+                <a:schemeClr val="accent5">
+                  <a:shade val="50000"/>
+                </a:schemeClr>
+              </a:lnRef>
+              <a:fillRef idx="1">
+                <a:schemeClr val="accent5"/>
+              </a:fillRef>
+              <a:effectRef idx="0">
+                <a:schemeClr val="accent5"/>
+              </a:effectRef>
+              <a:fontRef idx="minor">
+                <a:schemeClr val="lt1"/>
+              </a:fontRef>
+            </p:style>
+            <p:txBody>
+              <a:bodyPr rtlCol="0" anchor="ctr"/>
+              <a:lstStyle/>
+              <a:p>
+                <a:pPr algn="ctr"/>
+                <a:r>
+                  <a:rPr lang="en-US" sz="1400" dirty="0"/>
+                  <a:t>One-Time</a:t>
+                </a:r>
+              </a:p>
+            </p:txBody>
+          </p:sp>
+          <p:grpSp>
+            <p:nvGrpSpPr>
+              <p:cNvPr id="63" name="Group 62">
+                <a:extLst>
+                  <a:ext uri="{FF2B5EF4-FFF2-40B4-BE49-F238E27FC236}">
+                    <a16:creationId xmlns:a16="http://schemas.microsoft.com/office/drawing/2014/main" id="{CBB04E8D-3561-4663-AE87-FC19DC8839C2}"/>
+                  </a:ext>
+                </a:extLst>
+              </p:cNvPr>
+              <p:cNvGrpSpPr/>
+              <p:nvPr/>
+            </p:nvGrpSpPr>
+            <p:grpSpPr>
+              <a:xfrm>
+                <a:off x="5905498" y="1411374"/>
+                <a:ext cx="2124077" cy="238855"/>
+                <a:chOff x="5905498" y="1411374"/>
+                <a:chExt cx="2124077" cy="238855"/>
+              </a:xfrm>
+            </p:grpSpPr>
+            <p:sp>
+              <p:nvSpPr>
+                <p:cNvPr id="64" name="Arrow: Right 63">
+                  <a:extLst>
+                    <a:ext uri="{FF2B5EF4-FFF2-40B4-BE49-F238E27FC236}">
+                      <a16:creationId xmlns:a16="http://schemas.microsoft.com/office/drawing/2014/main" id="{4B9FC122-7AC3-40E2-B683-CE7EEFE0074D}"/>
+                    </a:ext>
+                  </a:extLst>
+                </p:cNvPr>
+                <p:cNvSpPr/>
+                <p:nvPr/>
+              </p:nvSpPr>
+              <p:spPr>
+                <a:xfrm flipH="1">
+                  <a:off x="5905498" y="1411374"/>
+                  <a:ext cx="2006599" cy="238855"/>
+                </a:xfrm>
+                <a:prstGeom prst="rightArrow">
+                  <a:avLst>
+                    <a:gd name="adj1" fmla="val 73438"/>
+                    <a:gd name="adj2" fmla="val 50000"/>
+                  </a:avLst>
+                </a:prstGeom>
+              </p:spPr>
+              <p:style>
+                <a:lnRef idx="2">
+                  <a:schemeClr val="accent2">
+                    <a:shade val="50000"/>
+                  </a:schemeClr>
+                </a:lnRef>
+                <a:fillRef idx="1">
+                  <a:schemeClr val="accent2"/>
+                </a:fillRef>
+                <a:effectRef idx="0">
+                  <a:schemeClr val="accent2"/>
+                </a:effectRef>
+                <a:fontRef idx="minor">
+                  <a:schemeClr val="lt1"/>
+                </a:fontRef>
+              </p:style>
+              <p:txBody>
+                <a:bodyPr rtlCol="0" anchor="ctr"/>
+                <a:lstStyle/>
+                <a:p>
+                  <a:pPr algn="ctr"/>
+                  <a:endParaRPr lang="en-US" sz="1400" dirty="0"/>
+                </a:p>
+              </p:txBody>
+            </p:sp>
+            <p:sp>
+              <p:nvSpPr>
+                <p:cNvPr id="65" name="Arrow: Right 64">
+                  <a:extLst>
+                    <a:ext uri="{FF2B5EF4-FFF2-40B4-BE49-F238E27FC236}">
+                      <a16:creationId xmlns:a16="http://schemas.microsoft.com/office/drawing/2014/main" id="{0AA14EE7-4A3C-451A-B1F6-B3AD516C2539}"/>
+                    </a:ext>
+                  </a:extLst>
+                </p:cNvPr>
+                <p:cNvSpPr/>
+                <p:nvPr/>
+              </p:nvSpPr>
+              <p:spPr>
+                <a:xfrm>
+                  <a:off x="6022975" y="1411374"/>
+                  <a:ext cx="2006600" cy="238855"/>
+                </a:xfrm>
+                <a:prstGeom prst="rightArrow">
+                  <a:avLst>
+                    <a:gd name="adj1" fmla="val 73438"/>
+                    <a:gd name="adj2" fmla="val 50000"/>
+                  </a:avLst>
+                </a:prstGeom>
+              </p:spPr>
+              <p:style>
+                <a:lnRef idx="2">
+                  <a:schemeClr val="accent2">
+                    <a:shade val="50000"/>
+                  </a:schemeClr>
+                </a:lnRef>
+                <a:fillRef idx="1">
+                  <a:schemeClr val="accent2"/>
+                </a:fillRef>
+                <a:effectRef idx="0">
+                  <a:schemeClr val="accent2"/>
+                </a:effectRef>
+                <a:fontRef idx="minor">
+                  <a:schemeClr val="lt1"/>
+                </a:fontRef>
+              </p:style>
+              <p:txBody>
+                <a:bodyPr rtlCol="0" anchor="ctr"/>
+                <a:lstStyle/>
+                <a:p>
+                  <a:pPr algn="ctr"/>
+                  <a:r>
+                    <a:rPr lang="en-US" sz="1400" dirty="0"/>
+                    <a:t>Two-Way</a:t>
+                  </a:r>
+                </a:p>
+              </p:txBody>
+            </p:sp>
+            <p:sp>
+              <p:nvSpPr>
+                <p:cNvPr id="66" name="Rectangle 65">
+                  <a:extLst>
+                    <a:ext uri="{FF2B5EF4-FFF2-40B4-BE49-F238E27FC236}">
+                      <a16:creationId xmlns:a16="http://schemas.microsoft.com/office/drawing/2014/main" id="{A2349434-719C-4F40-8B10-6936EA7ED3C0}"/>
+                    </a:ext>
+                  </a:extLst>
+                </p:cNvPr>
+                <p:cNvSpPr/>
+                <p:nvPr/>
+              </p:nvSpPr>
+              <p:spPr>
+                <a:xfrm>
+                  <a:off x="5998873" y="1458129"/>
+                  <a:ext cx="206375" cy="148421"/>
+                </a:xfrm>
+                <a:prstGeom prst="rect">
+                  <a:avLst/>
+                </a:prstGeom>
+                <a:solidFill>
+                  <a:schemeClr val="accent2"/>
+                </a:solidFill>
+                <a:ln>
+                  <a:noFill/>
+                </a:ln>
+              </p:spPr>
+              <p:style>
+                <a:lnRef idx="2">
+                  <a:schemeClr val="accent1">
+                    <a:shade val="50000"/>
+                  </a:schemeClr>
+                </a:lnRef>
+                <a:fillRef idx="1">
+                  <a:schemeClr val="accent1"/>
+                </a:fillRef>
+                <a:effectRef idx="0">
+                  <a:schemeClr val="accent1"/>
+                </a:effectRef>
+                <a:fontRef idx="minor">
+                  <a:schemeClr val="lt1"/>
+                </a:fontRef>
+              </p:style>
+              <p:txBody>
+                <a:bodyPr rtlCol="0" anchor="ctr"/>
+                <a:lstStyle/>
+                <a:p>
+                  <a:pPr algn="ctr"/>
+                  <a:endParaRPr lang="en-US"/>
+                </a:p>
+              </p:txBody>
+            </p:sp>
+          </p:grpSp>
+        </p:grpSp>
+        <p:sp>
+          <p:nvSpPr>
+            <p:cNvPr id="68" name="Rectangle: Rounded Corners 67">
+              <a:extLst>
+                <a:ext uri="{FF2B5EF4-FFF2-40B4-BE49-F238E27FC236}">
+                  <a16:creationId xmlns:a16="http://schemas.microsoft.com/office/drawing/2014/main" id="{7778E963-B565-4632-A5DF-0ABFA68A6666}"/>
+                </a:ext>
+              </a:extLst>
+            </p:cNvPr>
+            <p:cNvSpPr/>
+            <p:nvPr/>
+          </p:nvSpPr>
+          <p:spPr>
+            <a:xfrm>
+              <a:off x="4133460" y="4128798"/>
+              <a:ext cx="1747935" cy="905067"/>
+            </a:xfrm>
+            <a:prstGeom prst="roundRect">
+              <a:avLst>
+                <a:gd name="adj" fmla="val 8599"/>
+              </a:avLst>
+            </a:prstGeom>
+          </p:spPr>
+          <p:style>
+            <a:lnRef idx="2">
+              <a:schemeClr val="accent6"/>
+            </a:lnRef>
+            <a:fillRef idx="1">
+              <a:schemeClr val="lt1"/>
+            </a:fillRef>
+            <a:effectRef idx="0">
+              <a:schemeClr val="accent6"/>
+            </a:effectRef>
+            <a:fontRef idx="minor">
+              <a:schemeClr val="dk1"/>
+            </a:fontRef>
+          </p:style>
+          <p:txBody>
+            <a:bodyPr rtlCol="0" anchor="ctr"/>
+            <a:lstStyle/>
+            <a:p>
+              <a:pPr algn="ctr"/>
+              <a:r>
+                <a:rPr lang="en-US" dirty="0"/>
+                <a:t>XML Model</a:t>
+              </a:r>
+            </a:p>
+          </p:txBody>
+        </p:sp>
+        <p:sp>
+          <p:nvSpPr>
+            <p:cNvPr id="79" name="Arrow: Left-Right 78">
+              <a:extLst>
+                <a:ext uri="{FF2B5EF4-FFF2-40B4-BE49-F238E27FC236}">
+                  <a16:creationId xmlns:a16="http://schemas.microsoft.com/office/drawing/2014/main" id="{7F802644-DFF8-4BC0-AF42-89E2423DC0B1}"/>
+                </a:ext>
+              </a:extLst>
+            </p:cNvPr>
+            <p:cNvSpPr/>
+            <p:nvPr/>
+          </p:nvSpPr>
+          <p:spPr>
+            <a:xfrm>
+              <a:off x="1854456" y="4390733"/>
+              <a:ext cx="2254899" cy="381195"/>
+            </a:xfrm>
+            <a:prstGeom prst="leftRightArrow">
+              <a:avLst/>
+            </a:prstGeom>
+            <a:ln>
+              <a:prstDash val="dash"/>
+            </a:ln>
+          </p:spPr>
+          <p:style>
+            <a:lnRef idx="2">
+              <a:schemeClr val="accent3">
+                <a:shade val="50000"/>
+              </a:schemeClr>
+            </a:lnRef>
+            <a:fillRef idx="1">
+              <a:schemeClr val="accent3"/>
+            </a:fillRef>
+            <a:effectRef idx="0">
+              <a:schemeClr val="accent3"/>
+            </a:effectRef>
+            <a:fontRef idx="minor">
+              <a:schemeClr val="lt1"/>
+            </a:fontRef>
+          </p:style>
+          <p:txBody>
+            <a:bodyPr rtlCol="0" anchor="ctr"/>
+            <a:lstStyle/>
+            <a:p>
+              <a:pPr algn="ctr"/>
+              <a:endParaRPr lang="en-US" sz="1400" dirty="0"/>
+            </a:p>
+          </p:txBody>
+        </p:sp>
+        <p:sp>
+          <p:nvSpPr>
+            <p:cNvPr id="30" name="Flowchart: Multidocument 29">
+              <a:extLst>
+                <a:ext uri="{FF2B5EF4-FFF2-40B4-BE49-F238E27FC236}">
+                  <a16:creationId xmlns:a16="http://schemas.microsoft.com/office/drawing/2014/main" id="{C1EAF519-8F92-4D92-9AF6-955420F7178F}"/>
+                </a:ext>
+              </a:extLst>
+            </p:cNvPr>
+            <p:cNvSpPr/>
+            <p:nvPr/>
+          </p:nvSpPr>
+          <p:spPr>
+            <a:xfrm>
+              <a:off x="606488" y="3968621"/>
+              <a:ext cx="1474237" cy="1250302"/>
+            </a:xfrm>
+            <a:prstGeom prst="flowChartMultidocument">
+              <a:avLst/>
+            </a:prstGeom>
+          </p:spPr>
+          <p:style>
+            <a:lnRef idx="2">
+              <a:schemeClr val="accent4">
+                <a:shade val="50000"/>
+              </a:schemeClr>
+            </a:lnRef>
+            <a:fillRef idx="1">
+              <a:schemeClr val="accent4"/>
+            </a:fillRef>
+            <a:effectRef idx="0">
+              <a:schemeClr val="accent4"/>
+            </a:effectRef>
+            <a:fontRef idx="minor">
+              <a:schemeClr val="lt1"/>
+            </a:fontRef>
+          </p:style>
+          <p:txBody>
+            <a:bodyPr rtlCol="0" anchor="ctr"/>
+            <a:lstStyle/>
+            <a:p>
+              <a:pPr algn="ctr"/>
+              <a:r>
+                <a:rPr lang="en-US" sz="1400" dirty="0"/>
+                <a:t>XML</a:t>
+              </a:r>
+            </a:p>
+          </p:txBody>
+        </p:sp>
+      </p:grpSp>
+      <p:grpSp>
+        <p:nvGrpSpPr>
+          <p:cNvPr id="84" name="Group 83">
+            <a:extLst>
+              <a:ext uri="{FF2B5EF4-FFF2-40B4-BE49-F238E27FC236}">
+                <a16:creationId xmlns:a16="http://schemas.microsoft.com/office/drawing/2014/main" id="{A3F5F6F6-77E5-4E45-8D26-356A34A30125}"/>
+              </a:ext>
+            </a:extLst>
+          </p:cNvPr>
+          <p:cNvGrpSpPr/>
+          <p:nvPr/>
+        </p:nvGrpSpPr>
+        <p:grpSpPr>
+          <a:xfrm>
+            <a:off x="606490" y="5447524"/>
+            <a:ext cx="9144000" cy="1250302"/>
+            <a:chOff x="606490" y="5447524"/>
+            <a:chExt cx="9144000" cy="1250302"/>
+          </a:xfrm>
+        </p:grpSpPr>
+        <p:sp>
+          <p:nvSpPr>
+            <p:cNvPr id="40" name="Rectangle 39">
+              <a:extLst>
+                <a:ext uri="{FF2B5EF4-FFF2-40B4-BE49-F238E27FC236}">
+                  <a16:creationId xmlns:a16="http://schemas.microsoft.com/office/drawing/2014/main" id="{287154C7-165D-42CA-AD88-2504682E2242}"/>
+                </a:ext>
+              </a:extLst>
+            </p:cNvPr>
+            <p:cNvSpPr/>
+            <p:nvPr/>
+          </p:nvSpPr>
+          <p:spPr>
+            <a:xfrm>
+              <a:off x="8061649" y="5617029"/>
+              <a:ext cx="1688841" cy="905067"/>
+            </a:xfrm>
+            <a:prstGeom prst="rect">
+              <a:avLst/>
+            </a:prstGeom>
+          </p:spPr>
+          <p:style>
+            <a:lnRef idx="3">
+              <a:schemeClr val="lt1"/>
+            </a:lnRef>
+            <a:fillRef idx="1">
+              <a:schemeClr val="dk1"/>
+            </a:fillRef>
+            <a:effectRef idx="1">
+              <a:schemeClr val="dk1"/>
+            </a:effectRef>
+            <a:fontRef idx="minor">
+              <a:schemeClr val="lt1"/>
+            </a:fontRef>
+          </p:style>
+          <p:txBody>
+            <a:bodyPr rtlCol="0" anchor="ctr"/>
+            <a:lstStyle/>
+            <a:p>
+              <a:pPr algn="ctr"/>
+              <a:r>
+                <a:rPr lang="en-US" dirty="0"/>
+                <a:t>View</a:t>
+              </a:r>
+            </a:p>
+          </p:txBody>
+        </p:sp>
+        <p:sp>
+          <p:nvSpPr>
+            <p:cNvPr id="69" name="Rectangle: Rounded Corners 68">
+              <a:extLst>
+                <a:ext uri="{FF2B5EF4-FFF2-40B4-BE49-F238E27FC236}">
+                  <a16:creationId xmlns:a16="http://schemas.microsoft.com/office/drawing/2014/main" id="{03FBD90E-87FA-4343-8DFD-37EAC65DCBE5}"/>
+                </a:ext>
+              </a:extLst>
+            </p:cNvPr>
+            <p:cNvSpPr/>
+            <p:nvPr/>
+          </p:nvSpPr>
+          <p:spPr>
+            <a:xfrm>
+              <a:off x="4130352" y="5617028"/>
+              <a:ext cx="1747935" cy="905067"/>
+            </a:xfrm>
+            <a:prstGeom prst="roundRect">
+              <a:avLst>
+                <a:gd name="adj" fmla="val 8599"/>
+              </a:avLst>
+            </a:prstGeom>
+          </p:spPr>
+          <p:style>
+            <a:lnRef idx="2">
+              <a:schemeClr val="accent6"/>
+            </a:lnRef>
+            <a:fillRef idx="1">
+              <a:schemeClr val="lt1"/>
+            </a:fillRef>
+            <a:effectRef idx="0">
+              <a:schemeClr val="accent6"/>
+            </a:effectRef>
+            <a:fontRef idx="minor">
+              <a:schemeClr val="dk1"/>
+            </a:fontRef>
+          </p:style>
+          <p:txBody>
+            <a:bodyPr rtlCol="0" anchor="ctr"/>
+            <a:lstStyle/>
+            <a:p>
+              <a:pPr algn="ctr"/>
+              <a:r>
+                <a:rPr lang="en-US" dirty="0"/>
+                <a:t>Resource Model</a:t>
+              </a:r>
+            </a:p>
+          </p:txBody>
+        </p:sp>
+        <p:sp>
+          <p:nvSpPr>
+            <p:cNvPr id="72" name="Arrow: Right 71">
+              <a:extLst>
+                <a:ext uri="{FF2B5EF4-FFF2-40B4-BE49-F238E27FC236}">
+                  <a16:creationId xmlns:a16="http://schemas.microsoft.com/office/drawing/2014/main" id="{BEF7AD2E-706E-43BA-854F-ADB127DA60E0}"/>
+                </a:ext>
+              </a:extLst>
+            </p:cNvPr>
+            <p:cNvSpPr/>
+            <p:nvPr/>
+          </p:nvSpPr>
+          <p:spPr>
+            <a:xfrm>
+              <a:off x="5905500" y="6247621"/>
+              <a:ext cx="2124075" cy="238855"/>
+            </a:xfrm>
+            <a:prstGeom prst="rightArrow">
+              <a:avLst>
+                <a:gd name="adj1" fmla="val 73438"/>
+                <a:gd name="adj2" fmla="val 50000"/>
+              </a:avLst>
+            </a:prstGeom>
+          </p:spPr>
+          <p:style>
+            <a:lnRef idx="2">
+              <a:schemeClr val="accent2">
+                <a:shade val="50000"/>
+              </a:schemeClr>
+            </a:lnRef>
+            <a:fillRef idx="1">
+              <a:schemeClr val="accent2"/>
+            </a:fillRef>
+            <a:effectRef idx="0">
+              <a:schemeClr val="accent2"/>
+            </a:effectRef>
+            <a:fontRef idx="minor">
+              <a:schemeClr val="lt1"/>
+            </a:fontRef>
+          </p:style>
+          <p:txBody>
+            <a:bodyPr rtlCol="0" anchor="ctr"/>
+            <a:lstStyle/>
+            <a:p>
+              <a:pPr algn="ctr"/>
+              <a:r>
+                <a:rPr lang="en-US" sz="1400" dirty="0"/>
+                <a:t>One-Time</a:t>
+              </a:r>
+            </a:p>
+          </p:txBody>
+        </p:sp>
+        <p:sp>
+          <p:nvSpPr>
+            <p:cNvPr id="80" name="Arrow: Left-Right 79">
+              <a:extLst>
+                <a:ext uri="{FF2B5EF4-FFF2-40B4-BE49-F238E27FC236}">
+                  <a16:creationId xmlns:a16="http://schemas.microsoft.com/office/drawing/2014/main" id="{13278DFC-8A02-465B-A028-200DDECD1566}"/>
+                </a:ext>
+              </a:extLst>
+            </p:cNvPr>
+            <p:cNvSpPr/>
+            <p:nvPr/>
+          </p:nvSpPr>
+          <p:spPr>
+            <a:xfrm>
+              <a:off x="1861846" y="5878963"/>
+              <a:ext cx="2254899" cy="381195"/>
+            </a:xfrm>
+            <a:prstGeom prst="leftRightArrow">
+              <a:avLst/>
+            </a:prstGeom>
+            <a:ln>
+              <a:prstDash val="dash"/>
+            </a:ln>
+          </p:spPr>
+          <p:style>
+            <a:lnRef idx="2">
+              <a:schemeClr val="accent3">
+                <a:shade val="50000"/>
+              </a:schemeClr>
+            </a:lnRef>
+            <a:fillRef idx="1">
+              <a:schemeClr val="accent3"/>
+            </a:fillRef>
+            <a:effectRef idx="0">
+              <a:schemeClr val="accent3"/>
+            </a:effectRef>
+            <a:fontRef idx="minor">
+              <a:schemeClr val="lt1"/>
+            </a:fontRef>
+          </p:style>
+          <p:txBody>
+            <a:bodyPr rtlCol="0" anchor="ctr"/>
+            <a:lstStyle/>
+            <a:p>
+              <a:pPr algn="ctr"/>
+              <a:endParaRPr lang="en-US" sz="1400" dirty="0"/>
+            </a:p>
+          </p:txBody>
+        </p:sp>
+        <p:sp>
+          <p:nvSpPr>
+            <p:cNvPr id="17" name="Flowchart: Multidocument 16">
+              <a:extLst>
+                <a:ext uri="{FF2B5EF4-FFF2-40B4-BE49-F238E27FC236}">
+                  <a16:creationId xmlns:a16="http://schemas.microsoft.com/office/drawing/2014/main" id="{766544C0-F396-4343-8755-4537CF6B1D1B}"/>
+                </a:ext>
+              </a:extLst>
+            </p:cNvPr>
+            <p:cNvSpPr/>
+            <p:nvPr/>
+          </p:nvSpPr>
+          <p:spPr>
+            <a:xfrm>
+              <a:off x="606490" y="5447524"/>
+              <a:ext cx="1474237" cy="1250302"/>
+            </a:xfrm>
+            <a:prstGeom prst="flowChartMultidocument">
+              <a:avLst/>
+            </a:prstGeom>
+          </p:spPr>
+          <p:style>
+            <a:lnRef idx="2">
+              <a:schemeClr val="accent4">
+                <a:shade val="50000"/>
+              </a:schemeClr>
+            </a:lnRef>
+            <a:fillRef idx="1">
+              <a:schemeClr val="accent4"/>
+            </a:fillRef>
+            <a:effectRef idx="0">
+              <a:schemeClr val="accent4"/>
+            </a:effectRef>
+            <a:fontRef idx="minor">
+              <a:schemeClr val="lt1"/>
+            </a:fontRef>
+          </p:style>
+          <p:txBody>
+            <a:bodyPr rtlCol="0" anchor="ctr"/>
+            <a:lstStyle/>
+            <a:p>
+              <a:pPr algn="ctr"/>
+              <a:r>
+                <a:rPr lang="en-US" sz="1400" dirty="0"/>
+                <a:t>Resources</a:t>
+              </a:r>
+              <a:br>
+                <a:rPr lang="en-US" sz="1400" dirty="0"/>
+              </a:br>
+              <a:r>
+                <a:rPr lang="en-US" sz="1400" dirty="0"/>
+                <a:t>(e.g. i18n)</a:t>
+              </a:r>
+            </a:p>
+          </p:txBody>
+        </p:sp>
+      </p:grpSp>
+      <p:cxnSp>
+        <p:nvCxnSpPr>
+          <p:cNvPr id="86" name="Straight Connector 85">
+            <a:extLst>
+              <a:ext uri="{FF2B5EF4-FFF2-40B4-BE49-F238E27FC236}">
+                <a16:creationId xmlns:a16="http://schemas.microsoft.com/office/drawing/2014/main" id="{09E517B9-D0D1-4E45-8E67-8DBC594F2005}"/>
+              </a:ext>
+            </a:extLst>
+          </p:cNvPr>
+          <p:cNvCxnSpPr>
+            <a:cxnSpLocks/>
+            <a:stCxn id="2" idx="2"/>
+          </p:cNvCxnSpPr>
+          <p:nvPr/>
+        </p:nvCxnSpPr>
+        <p:spPr>
+          <a:xfrm flipH="1">
+            <a:off x="2941669" y="1326797"/>
+            <a:ext cx="9456" cy="5531203"/>
+          </a:xfrm>
+          <a:prstGeom prst="line">
+            <a:avLst/>
+          </a:prstGeom>
+          <a:ln w="38100">
+            <a:prstDash val="dash"/>
+          </a:ln>
+        </p:spPr>
+        <p:style>
+          <a:lnRef idx="1">
+            <a:schemeClr val="accent2"/>
+          </a:lnRef>
+          <a:fillRef idx="0">
+            <a:schemeClr val="accent2"/>
+          </a:fillRef>
+          <a:effectRef idx="0">
+            <a:schemeClr val="accent2"/>
+          </a:effectRef>
+          <a:fontRef idx="minor">
+            <a:schemeClr val="tx1"/>
+          </a:fontRef>
+        </p:style>
+      </p:cxnSp>
+      <p:sp>
+        <p:nvSpPr>
+          <p:cNvPr id="87" name="TextBox 86">
+            <a:extLst>
+              <a:ext uri="{FF2B5EF4-FFF2-40B4-BE49-F238E27FC236}">
+                <a16:creationId xmlns:a16="http://schemas.microsoft.com/office/drawing/2014/main" id="{2D887E15-FB5A-4764-A8C3-7B178A3C02E8}"/>
+              </a:ext>
+            </a:extLst>
+          </p:cNvPr>
+          <p:cNvSpPr txBox="1"/>
+          <p:nvPr/>
+        </p:nvSpPr>
+        <p:spPr>
+          <a:xfrm>
+            <a:off x="1970998" y="6367048"/>
+            <a:ext cx="920035" cy="369332"/>
+          </a:xfrm>
+          <a:prstGeom prst="rect">
+            <a:avLst/>
+          </a:prstGeom>
+          <a:noFill/>
+        </p:spPr>
+        <p:txBody>
+          <a:bodyPr wrap="square" rtlCol="0">
+            <a:spAutoFit/>
+          </a:bodyPr>
+          <a:lstStyle/>
+          <a:p>
+            <a:r>
+              <a:rPr lang="en-US" dirty="0">
+                <a:solidFill>
+                  <a:srgbClr val="FF0000"/>
+                </a:solidFill>
+              </a:rPr>
+              <a:t>Server</a:t>
+            </a:r>
+          </a:p>
+        </p:txBody>
+      </p:sp>
+      <p:sp>
+        <p:nvSpPr>
+          <p:cNvPr id="88" name="TextBox 87">
+            <a:extLst>
+              <a:ext uri="{FF2B5EF4-FFF2-40B4-BE49-F238E27FC236}">
+                <a16:creationId xmlns:a16="http://schemas.microsoft.com/office/drawing/2014/main" id="{2DA34F24-3031-44DD-8F6F-1E51CBE3D257}"/>
+              </a:ext>
+            </a:extLst>
+          </p:cNvPr>
+          <p:cNvSpPr txBox="1"/>
+          <p:nvPr/>
+        </p:nvSpPr>
+        <p:spPr>
+          <a:xfrm>
+            <a:off x="3075993" y="6367048"/>
+            <a:ext cx="920035" cy="369332"/>
+          </a:xfrm>
+          <a:prstGeom prst="rect">
+            <a:avLst/>
+          </a:prstGeom>
+          <a:noFill/>
+        </p:spPr>
+        <p:txBody>
+          <a:bodyPr wrap="square" rtlCol="0">
+            <a:spAutoFit/>
+          </a:bodyPr>
+          <a:lstStyle/>
+          <a:p>
+            <a:r>
+              <a:rPr lang="en-US" dirty="0">
+                <a:solidFill>
+                  <a:srgbClr val="00B0F0"/>
+                </a:solidFill>
+              </a:rPr>
+              <a:t>Client</a:t>
+            </a:r>
+          </a:p>
+        </p:txBody>
+      </p:sp>
+    </p:spTree>
+    <p:extLst>
+      <p:ext uri="{BB962C8B-B14F-4D97-AF65-F5344CB8AC3E}">
+        <p14:creationId xmlns:p14="http://schemas.microsoft.com/office/powerpoint/2010/main" val="3033598713"/>
+      </p:ext>
+    </p:extLst>
+  </p:cSld>
+  <p:clrMapOvr>
+    <a:masterClrMapping/>
+  </p:clrMapOvr>
+</p:sld>
+</file>
+
+<file path=ppt/slides/slide7.xml><?xml version="1.0" encoding="utf-8"?>
+<p:sld xmlns:a="http://schemas.openxmlformats.org/drawingml/2006/main" xmlns:r="http://schemas.openxmlformats.org/officeDocument/2006/relationships" xmlns:p="http://schemas.openxmlformats.org/presentationml/2006/main">
+  <p:cSld>
+    <p:spTree>
+      <p:nvGrpSpPr>
+        <p:cNvPr id="1" name=""/>
+        <p:cNvGrpSpPr/>
+        <p:nvPr/>
+      </p:nvGrpSpPr>
+      <p:grpSpPr>
+        <a:xfrm>
+          <a:off x="0" y="0"/>
+          <a:ext cx="0" cy="0"/>
+          <a:chOff x="0" y="0"/>
+          <a:chExt cx="0" cy="0"/>
+        </a:xfrm>
+      </p:grpSpPr>
+      <p:sp>
+        <p:nvSpPr>
           <p:cNvPr id="4" name="Title 3">
             <a:extLst>
               <a:ext uri="{FF2B5EF4-FFF2-40B4-BE49-F238E27FC236}">
@@ -12446,10 +15480,9 @@
           </a:p>
           <a:p>
             <a:r>
-              <a:rPr lang="en-US" dirty="0" err="1"/>
-              <a:t>JsonModel</a:t>
+              <a:rPr lang="en-US" dirty="0"/>
+              <a:t>JSON Model</a:t>
             </a:r>
-            <a:endParaRPr lang="en-US" dirty="0"/>
           </a:p>
           <a:p>
             <a:r>
@@ -12460,9 +15493,153 @@
           </a:p>
           <a:p>
             <a:r>
-              <a:rPr lang="en-US"/>
+              <a:rPr lang="en-US" dirty="0"/>
               <a:t>Working with APIs</a:t>
             </a:r>
+          </a:p>
+          <a:p>
+            <a:endParaRPr lang="en-US" dirty="0"/>
+          </a:p>
+        </p:txBody>
+      </p:sp>
+      <p:pic>
+        <p:nvPicPr>
+          <p:cNvPr id="5" name="Picture 4" descr="A screenshot of a computer&#10;&#10;Description automatically generated">
+            <a:extLst>
+              <a:ext uri="{FF2B5EF4-FFF2-40B4-BE49-F238E27FC236}">
+                <a16:creationId xmlns:a16="http://schemas.microsoft.com/office/drawing/2014/main" id="{361CD626-4F83-4274-8446-2A9AB2686893}"/>
+              </a:ext>
+            </a:extLst>
+          </p:cNvPr>
+          <p:cNvPicPr>
+            <a:picLocks noChangeAspect="1"/>
+          </p:cNvPicPr>
+          <p:nvPr/>
+        </p:nvPicPr>
+        <p:blipFill>
+          <a:blip r:embed="rId2">
+            <a:extLst>
+              <a:ext uri="{28A0092B-C50C-407E-A947-70E740481C1C}">
+                <a14:useLocalDpi xmlns:a14="http://schemas.microsoft.com/office/drawing/2010/main" val="0"/>
+              </a:ext>
+            </a:extLst>
+          </a:blip>
+          <a:stretch>
+            <a:fillRect/>
+          </a:stretch>
+        </p:blipFill>
+        <p:spPr>
+          <a:xfrm>
+            <a:off x="5113251" y="0"/>
+            <a:ext cx="4839641" cy="6858000"/>
+          </a:xfrm>
+          <a:prstGeom prst="rect">
+            <a:avLst/>
+          </a:prstGeom>
+        </p:spPr>
+      </p:pic>
+    </p:spTree>
+    <p:extLst>
+      <p:ext uri="{BB962C8B-B14F-4D97-AF65-F5344CB8AC3E}">
+        <p14:creationId xmlns:p14="http://schemas.microsoft.com/office/powerpoint/2010/main" val="1570314837"/>
+      </p:ext>
+    </p:extLst>
+  </p:cSld>
+  <p:clrMapOvr>
+    <a:masterClrMapping/>
+  </p:clrMapOvr>
+</p:sld>
+</file>
+
+<file path=ppt/slides/slide8.xml><?xml version="1.0" encoding="utf-8"?>
+<p:sld xmlns:a="http://schemas.openxmlformats.org/drawingml/2006/main" xmlns:r="http://schemas.openxmlformats.org/officeDocument/2006/relationships" xmlns:p="http://schemas.openxmlformats.org/presentationml/2006/main">
+  <p:cSld>
+    <p:spTree>
+      <p:nvGrpSpPr>
+        <p:cNvPr id="1" name=""/>
+        <p:cNvGrpSpPr/>
+        <p:nvPr/>
+      </p:nvGrpSpPr>
+      <p:grpSpPr>
+        <a:xfrm>
+          <a:off x="0" y="0"/>
+          <a:ext cx="0" cy="0"/>
+          <a:chOff x="0" y="0"/>
+          <a:chExt cx="0" cy="0"/>
+        </a:xfrm>
+      </p:grpSpPr>
+      <p:sp>
+        <p:nvSpPr>
+          <p:cNvPr id="4" name="Title 3">
+            <a:extLst>
+              <a:ext uri="{FF2B5EF4-FFF2-40B4-BE49-F238E27FC236}">
+                <a16:creationId xmlns:a16="http://schemas.microsoft.com/office/drawing/2014/main" id="{AB99A3A9-1BA5-4EAD-9B6F-495023820A50}"/>
+              </a:ext>
+            </a:extLst>
+          </p:cNvPr>
+          <p:cNvSpPr>
+            <a:spLocks noGrp="1"/>
+          </p:cNvSpPr>
+          <p:nvPr>
+            <p:ph type="title"/>
+          </p:nvPr>
+        </p:nvSpPr>
+        <p:spPr/>
+        <p:txBody>
+          <a:bodyPr/>
+          <a:lstStyle/>
+          <a:p>
+            <a:r>
+              <a:rPr lang="en-US" dirty="0"/>
+              <a:t>App#9: JSON Model</a:t>
+            </a:r>
+          </a:p>
+        </p:txBody>
+      </p:sp>
+      <p:sp>
+        <p:nvSpPr>
+          <p:cNvPr id="2" name="Text Placeholder 1">
+            <a:extLst>
+              <a:ext uri="{FF2B5EF4-FFF2-40B4-BE49-F238E27FC236}">
+                <a16:creationId xmlns:a16="http://schemas.microsoft.com/office/drawing/2014/main" id="{AB981738-845F-49A4-941E-581364438677}"/>
+              </a:ext>
+            </a:extLst>
+          </p:cNvPr>
+          <p:cNvSpPr>
+            <a:spLocks noGrp="1"/>
+          </p:cNvSpPr>
+          <p:nvPr>
+            <p:ph type="body" idx="1"/>
+          </p:nvPr>
+        </p:nvSpPr>
+        <p:spPr/>
+        <p:txBody>
+          <a:bodyPr/>
+          <a:lstStyle/>
+          <a:p>
+            <a:r>
+              <a:rPr lang="en-US" dirty="0"/>
+              <a:t>Path in models</a:t>
+            </a:r>
+          </a:p>
+          <a:p>
+            <a:r>
+              <a:rPr lang="en-US" dirty="0"/>
+              <a:t>Generate </a:t>
+            </a:r>
+            <a:r>
+              <a:rPr lang="en-US" dirty="0" err="1"/>
+              <a:t>JSDoc</a:t>
+            </a:r>
+            <a:r>
+              <a:rPr lang="en-US" dirty="0"/>
+              <a:t> Comment</a:t>
+            </a:r>
+          </a:p>
+          <a:p>
+            <a:endParaRPr lang="en-US" dirty="0"/>
+          </a:p>
+          <a:p>
             <a:endParaRPr lang="en-US" dirty="0"/>
           </a:p>
           <a:p>
@@ -12509,7 +15686,7 @@
     </p:spTree>
     <p:extLst>
       <p:ext uri="{BB962C8B-B14F-4D97-AF65-F5344CB8AC3E}">
-        <p14:creationId xmlns:p14="http://schemas.microsoft.com/office/powerpoint/2010/main" val="1570314837"/>
+        <p14:creationId xmlns:p14="http://schemas.microsoft.com/office/powerpoint/2010/main" val="1408345967"/>
       </p:ext>
     </p:extLst>
   </p:cSld>

</xml_diff>